<commit_message>
Adding schemas to ppt
</commit_message>
<xml_diff>
--- a/presentation_projet_clement_lore.pptx
+++ b/presentation_projet_clement_lore.pptx
@@ -5,15 +5,17 @@
     <p:sldMasterId id="2147483720" r:id="rId1"/>
   </p:sldMasterIdLst>
   <p:notesMasterIdLst>
-    <p:notesMasterId r:id="rId8"/>
+    <p:notesMasterId r:id="rId10"/>
   </p:notesMasterIdLst>
   <p:sldIdLst>
     <p:sldId id="256" r:id="rId2"/>
     <p:sldId id="257" r:id="rId3"/>
-    <p:sldId id="258" r:id="rId4"/>
-    <p:sldId id="259" r:id="rId5"/>
-    <p:sldId id="260" r:id="rId6"/>
-    <p:sldId id="261" r:id="rId7"/>
+    <p:sldId id="263" r:id="rId4"/>
+    <p:sldId id="258" r:id="rId5"/>
+    <p:sldId id="259" r:id="rId6"/>
+    <p:sldId id="262" r:id="rId7"/>
+    <p:sldId id="260" r:id="rId8"/>
+    <p:sldId id="261" r:id="rId9"/>
   </p:sldIdLst>
   <p:sldSz cx="12192000" cy="6858000"/>
   <p:notesSz cx="6858000" cy="9144000"/>
@@ -112,6 +114,11 @@
       </a:defRPr>
     </a:lvl9pPr>
   </p:defaultTextStyle>
+  <p:extLst>
+    <p:ext uri="{EFAFB233-063F-42B5-8137-9DF3F51BA10A}">
+      <p15:sldGuideLst xmlns:p15="http://schemas.microsoft.com/office/powerpoint/2012/main"/>
+    </p:ext>
+  </p:extLst>
 </p:presentation>
 </file>
 
@@ -741,7 +748,13 @@
   <p:cSld>
     <p:spTree>
       <p:nvGrpSpPr>
-        <p:cNvPr id="1" name=""/>
+        <p:cNvPr id="1" name="">
+          <a:extLst>
+            <a:ext uri="{FF2B5EF4-FFF2-40B4-BE49-F238E27FC236}">
+              <a16:creationId xmlns:a16="http://schemas.microsoft.com/office/drawing/2014/main" id="{26FDAD09-9E56-22D9-B9DF-7F4B2B6CBC29}"/>
+            </a:ext>
+          </a:extLst>
+        </p:cNvPr>
         <p:cNvGrpSpPr/>
         <p:nvPr/>
       </p:nvGrpSpPr>
@@ -755,7 +768,13 @@
       </p:grpSpPr>
       <p:sp>
         <p:nvSpPr>
-          <p:cNvPr id="2" name="Espace réservé de l'image des diapositives 1"/>
+          <p:cNvPr id="2" name="Espace réservé de l'image des diapositives 1">
+            <a:extLst>
+              <a:ext uri="{FF2B5EF4-FFF2-40B4-BE49-F238E27FC236}">
+                <a16:creationId xmlns:a16="http://schemas.microsoft.com/office/drawing/2014/main" id="{98960B68-AFB2-4101-08DB-8A3B33B3DF93}"/>
+              </a:ext>
+            </a:extLst>
+          </p:cNvPr>
           <p:cNvSpPr>
             <a:spLocks noGrp="1" noRot="1" noChangeAspect="1"/>
           </p:cNvSpPr>
@@ -767,7 +786,13 @@
       </p:sp>
       <p:sp>
         <p:nvSpPr>
-          <p:cNvPr id="3" name="Espace réservé des notes 2"/>
+          <p:cNvPr id="3" name="Espace réservé des notes 2">
+            <a:extLst>
+              <a:ext uri="{FF2B5EF4-FFF2-40B4-BE49-F238E27FC236}">
+                <a16:creationId xmlns:a16="http://schemas.microsoft.com/office/drawing/2014/main" id="{4EEFBF48-194D-4FB9-7195-7310A204DF82}"/>
+              </a:ext>
+            </a:extLst>
+          </p:cNvPr>
           <p:cNvSpPr>
             <a:spLocks noGrp="1"/>
           </p:cNvSpPr>
@@ -780,25 +805,9 @@
           <a:bodyPr/>
           <a:lstStyle/>
           <a:p>
-            <a:pPr>
-              <a:spcBef>
-                <a:spcPts val="1125"/>
-              </a:spcBef>
-            </a:pPr>
-            <a:r>
-              <a:rPr lang="fr-FR" b="1" dirty="0">
-                <a:effectLst/>
-              </a:rPr>
-              <a:t>Jobs Batch</a:t>
-            </a:r>
-          </a:p>
-          <a:p>
-            <a:r>
-              <a:rPr lang="fr-FR" dirty="0">
-                <a:effectLst/>
-                <a:latin typeface="Consolas" panose="020B0609020204030204" pitchFamily="49" charset="0"/>
-              </a:rPr>
-              <a:t>products_count.py:</a:t>
+            <a:r>
+              <a:rPr lang="fr-FR" dirty="0"/>
+              <a:t>Schéma de l'architecture</a:t>
             </a:r>
           </a:p>
           <a:p>
@@ -808,7 +817,23 @@
             </a:pPr>
             <a:r>
               <a:rPr lang="fr-FR" dirty="0"/>
-              <a:t>Analyse des produits les plus demandés</a:t>
+              <a:t>Hadoop HDFS (1 </a:t>
+            </a:r>
+            <a:r>
+              <a:rPr lang="fr-FR" dirty="0" err="1"/>
+              <a:t>namenode</a:t>
+            </a:r>
+            <a:r>
+              <a:rPr lang="fr-FR" dirty="0"/>
+              <a:t>, 4 </a:t>
+            </a:r>
+            <a:r>
+              <a:rPr lang="fr-FR" dirty="0" err="1"/>
+              <a:t>datanodes</a:t>
+            </a:r>
+            <a:r>
+              <a:rPr lang="fr-FR" dirty="0"/>
+              <a:t>)</a:t>
             </a:r>
           </a:p>
           <a:p>
@@ -818,20 +843,15 @@
             </a:pPr>
             <a:r>
               <a:rPr lang="fr-FR" dirty="0"/>
-              <a:t>Structure des données dans MongoDB</a:t>
-            </a:r>
-          </a:p>
-          <a:p>
-            <a:pPr marL="0" indent="0">
-              <a:buFontTx/>
-              <a:buNone/>
-            </a:pPr>
-            <a:r>
-              <a:rPr lang="fr-FR" dirty="0">
-                <a:effectLst/>
-                <a:latin typeface="Consolas" panose="020B0609020204030204" pitchFamily="49" charset="0"/>
-              </a:rPr>
-              <a:t>status_count.py</a:t>
+              <a:t>Spark (1 master, 4 </a:t>
+            </a:r>
+            <a:r>
+              <a:rPr lang="fr-FR" dirty="0" err="1"/>
+              <a:t>workers</a:t>
+            </a:r>
+            <a:r>
+              <a:rPr lang="fr-FR" dirty="0"/>
+              <a:t>)</a:t>
             </a:r>
           </a:p>
           <a:p>
@@ -841,8 +861,13 @@
             </a:pPr>
             <a:r>
               <a:rPr lang="fr-FR" dirty="0"/>
-              <a:t>Analyse des codes HTTP par heure</a:t>
-            </a:r>
+              <a:t>Kafka + </a:t>
+            </a:r>
+            <a:r>
+              <a:rPr lang="fr-FR" dirty="0" err="1"/>
+              <a:t>Zookeeper</a:t>
+            </a:r>
+            <a:endParaRPr lang="fr-FR" dirty="0"/>
           </a:p>
           <a:p>
             <a:pPr marL="171450" indent="-171450">
@@ -850,54 +875,18 @@
               <a:buChar char="-"/>
             </a:pPr>
             <a:r>
+              <a:rPr lang="fr-FR" dirty="0" err="1"/>
+              <a:t>MongoDBData</a:t>
+            </a:r>
+            <a:r>
               <a:rPr lang="fr-FR" dirty="0"/>
-              <a:t>Structure des données dans MongoDB</a:t>
-            </a:r>
-          </a:p>
-          <a:p>
+              <a:t> </a:t>
+            </a:r>
+            <a:r>
+              <a:rPr lang="fr-FR" dirty="0" err="1"/>
+              <a:t>Generator</a:t>
+            </a:r>
             <a:endParaRPr lang="fr-FR" dirty="0"/>
-          </a:p>
-          <a:p>
-            <a:pPr>
-              <a:spcBef>
-                <a:spcPts val="1125"/>
-              </a:spcBef>
-            </a:pPr>
-            <a:r>
-              <a:rPr lang="fr-FR" b="1" dirty="0">
-                <a:effectLst/>
-              </a:rPr>
-              <a:t>Jobs Streaming</a:t>
-            </a:r>
-          </a:p>
-          <a:p>
-            <a:r>
-              <a:rPr lang="fr-FR" dirty="0">
-                <a:effectLst/>
-                <a:latin typeface="Consolas" panose="020B0609020204030204" pitchFamily="49" charset="0"/>
-              </a:rPr>
-              <a:t>stream_job1.py</a:t>
-            </a:r>
-          </a:p>
-          <a:p>
-            <a:pPr marL="171450" indent="-171450">
-              <a:buFontTx/>
-              <a:buChar char="-"/>
-            </a:pPr>
-            <a:r>
-              <a:rPr lang="fr-FR" dirty="0"/>
-              <a:t>Surveillance de l'activité IP</a:t>
-            </a:r>
-          </a:p>
-          <a:p>
-            <a:pPr marL="171450" indent="-171450">
-              <a:buFontTx/>
-              <a:buChar char="-"/>
-            </a:pPr>
-            <a:r>
-              <a:rPr lang="fr-FR" dirty="0"/>
-              <a:t>Fenêtres temporelles de 2 minutes</a:t>
-            </a:r>
           </a:p>
           <a:p>
             <a:pPr marL="0" indent="0">
@@ -905,48 +894,31 @@
               <a:buNone/>
             </a:pPr>
             <a:r>
-              <a:rPr lang="fr-FR" dirty="0">
-                <a:effectLst/>
-                <a:latin typeface="Consolas" panose="020B0609020204030204" pitchFamily="49" charset="0"/>
-              </a:rPr>
-              <a:t>streamErreur.py</a:t>
-            </a:r>
-          </a:p>
-          <a:p>
-            <a:pPr marL="171450" indent="-171450">
+              <a:rPr lang="fr-FR" dirty="0"/>
+              <a:t>Justification des choix techniques</a:t>
+            </a:r>
+          </a:p>
+          <a:p>
+            <a:pPr marL="0" indent="0">
               <a:buFontTx/>
-              <a:buChar char="-"/>
+              <a:buNone/>
             </a:pPr>
             <a:r>
               <a:rPr lang="fr-FR" dirty="0"/>
-              <a:t>Détection des pics d'erreurs (404/500)</a:t>
-            </a:r>
-          </a:p>
-          <a:p>
-            <a:pPr marL="171450" indent="-171450">
-              <a:buFontTx/>
-              <a:buChar char="-"/>
-            </a:pPr>
-            <a:r>
-              <a:rPr lang="fr-FR" dirty="0"/>
-              <a:t>Fenêtres temporelles de 2 minutes</a:t>
-            </a:r>
-          </a:p>
-          <a:p>
-            <a:pPr marL="171450" indent="-171450">
-              <a:buFontTx/>
-              <a:buChar char="-"/>
-            </a:pPr>
-            <a:r>
-              <a:rPr lang="fr-FR" dirty="0"/>
-              <a:t>Seuils d'alerte</a:t>
-            </a:r>
-          </a:p>
-        </p:txBody>
-      </p:sp>
-      <p:sp>
-        <p:nvSpPr>
-          <p:cNvPr id="4" name="Espace réservé du numéro de diapositive 3"/>
+              <a:t>Flux de données</a:t>
+            </a:r>
+          </a:p>
+        </p:txBody>
+      </p:sp>
+      <p:sp>
+        <p:nvSpPr>
+          <p:cNvPr id="4" name="Espace réservé du numéro de diapositive 3">
+            <a:extLst>
+              <a:ext uri="{FF2B5EF4-FFF2-40B4-BE49-F238E27FC236}">
+                <a16:creationId xmlns:a16="http://schemas.microsoft.com/office/drawing/2014/main" id="{24BE3276-5A0C-6CE7-165B-AB7C426887E5}"/>
+              </a:ext>
+            </a:extLst>
+          </p:cNvPr>
           <p:cNvSpPr>
             <a:spLocks noGrp="1"/>
           </p:cNvSpPr>
@@ -970,7 +942,7 @@
     </p:spTree>
     <p:extLst>
       <p:ext uri="{BB962C8B-B14F-4D97-AF65-F5344CB8AC3E}">
-        <p14:creationId xmlns:p14="http://schemas.microsoft.com/office/powerpoint/2010/main" val="2535700536"/>
+        <p14:creationId xmlns:p14="http://schemas.microsoft.com/office/powerpoint/2010/main" val="2261166716"/>
       </p:ext>
     </p:extLst>
   </p:cSld>
@@ -1024,15 +996,166 @@
           <a:bodyPr/>
           <a:lstStyle/>
           <a:p>
+            <a:pPr>
+              <a:spcBef>
+                <a:spcPts val="1125"/>
+              </a:spcBef>
+            </a:pPr>
+            <a:r>
+              <a:rPr lang="fr-FR" b="1" dirty="0">
+                <a:effectLst/>
+              </a:rPr>
+              <a:t>Jobs Batch</a:t>
+            </a:r>
+          </a:p>
+          <a:p>
+            <a:r>
+              <a:rPr lang="fr-FR" dirty="0">
+                <a:effectLst/>
+                <a:latin typeface="Consolas" panose="020B0609020204030204" pitchFamily="49" charset="0"/>
+              </a:rPr>
+              <a:t>products_count.py:</a:t>
+            </a:r>
+          </a:p>
+          <a:p>
+            <a:pPr marL="171450" indent="-171450">
+              <a:buFontTx/>
+              <a:buChar char="-"/>
+            </a:pPr>
             <a:r>
               <a:rPr lang="fr-FR" dirty="0"/>
-              <a:t>Collections</a:t>
-            </a:r>
-          </a:p>
-          <a:p>
+              <a:t>Analyse des produits les plus demandés</a:t>
+            </a:r>
+          </a:p>
+          <a:p>
+            <a:pPr marL="171450" indent="-171450">
+              <a:buFontTx/>
+              <a:buChar char="-"/>
+            </a:pPr>
             <a:r>
               <a:rPr lang="fr-FR" dirty="0"/>
-              <a:t>Persistance des données avec MongoDB</a:t>
+              <a:t>Structure des données dans MongoDB</a:t>
+            </a:r>
+          </a:p>
+          <a:p>
+            <a:pPr marL="0" indent="0">
+              <a:buFontTx/>
+              <a:buNone/>
+            </a:pPr>
+            <a:r>
+              <a:rPr lang="fr-FR" dirty="0">
+                <a:effectLst/>
+                <a:latin typeface="Consolas" panose="020B0609020204030204" pitchFamily="49" charset="0"/>
+              </a:rPr>
+              <a:t>status_count.py</a:t>
+            </a:r>
+          </a:p>
+          <a:p>
+            <a:pPr marL="171450" indent="-171450">
+              <a:buFontTx/>
+              <a:buChar char="-"/>
+            </a:pPr>
+            <a:r>
+              <a:rPr lang="fr-FR" dirty="0"/>
+              <a:t>Analyse des codes HTTP par heure</a:t>
+            </a:r>
+          </a:p>
+          <a:p>
+            <a:pPr marL="171450" indent="-171450">
+              <a:buFontTx/>
+              <a:buChar char="-"/>
+            </a:pPr>
+            <a:r>
+              <a:rPr lang="fr-FR" dirty="0"/>
+              <a:t>Structure des données dans MongoDB</a:t>
+            </a:r>
+          </a:p>
+          <a:p>
+            <a:endParaRPr lang="fr-FR" dirty="0"/>
+          </a:p>
+          <a:p>
+            <a:pPr>
+              <a:spcBef>
+                <a:spcPts val="1125"/>
+              </a:spcBef>
+            </a:pPr>
+            <a:r>
+              <a:rPr lang="fr-FR" b="1" dirty="0">
+                <a:effectLst/>
+              </a:rPr>
+              <a:t>Jobs Streaming</a:t>
+            </a:r>
+          </a:p>
+          <a:p>
+            <a:r>
+              <a:rPr lang="fr-FR" dirty="0">
+                <a:effectLst/>
+                <a:latin typeface="Consolas" panose="020B0609020204030204" pitchFamily="49" charset="0"/>
+              </a:rPr>
+              <a:t>stream_job1.py</a:t>
+            </a:r>
+          </a:p>
+          <a:p>
+            <a:pPr marL="171450" indent="-171450">
+              <a:buFontTx/>
+              <a:buChar char="-"/>
+            </a:pPr>
+            <a:r>
+              <a:rPr lang="fr-FR" dirty="0"/>
+              <a:t>Surveillance de l'activité IP</a:t>
+            </a:r>
+          </a:p>
+          <a:p>
+            <a:pPr marL="171450" indent="-171450">
+              <a:buFontTx/>
+              <a:buChar char="-"/>
+            </a:pPr>
+            <a:r>
+              <a:rPr lang="fr-FR" dirty="0"/>
+              <a:t>Fenêtres temporelles de 2 minutes</a:t>
+            </a:r>
+          </a:p>
+          <a:p>
+            <a:pPr marL="0" indent="0">
+              <a:buFontTx/>
+              <a:buNone/>
+            </a:pPr>
+            <a:r>
+              <a:rPr lang="fr-FR" dirty="0">
+                <a:effectLst/>
+                <a:latin typeface="Consolas" panose="020B0609020204030204" pitchFamily="49" charset="0"/>
+              </a:rPr>
+              <a:t>streamErreur.py</a:t>
+            </a:r>
+          </a:p>
+          <a:p>
+            <a:pPr marL="171450" indent="-171450">
+              <a:buFontTx/>
+              <a:buChar char="-"/>
+            </a:pPr>
+            <a:r>
+              <a:rPr lang="fr-FR" dirty="0"/>
+              <a:t>Détection des pics d'erreurs (404/500)</a:t>
+            </a:r>
+          </a:p>
+          <a:p>
+            <a:pPr marL="171450" indent="-171450">
+              <a:buFontTx/>
+              <a:buChar char="-"/>
+            </a:pPr>
+            <a:r>
+              <a:rPr lang="fr-FR" dirty="0"/>
+              <a:t>Fenêtres temporelles de 2 minutes</a:t>
+            </a:r>
+          </a:p>
+          <a:p>
+            <a:pPr marL="171450" indent="-171450">
+              <a:buFontTx/>
+              <a:buChar char="-"/>
+            </a:pPr>
+            <a:r>
+              <a:rPr lang="fr-FR" dirty="0"/>
+              <a:t>Seuils d'alerte</a:t>
             </a:r>
           </a:p>
         </p:txBody>
@@ -1055,6 +1178,99 @@
             <a:fld id="{A5C5F6F7-2778-4174-AB5B-B167836FA54F}" type="slidenum">
               <a:rPr lang="fr-FR" smtClean="0"/>
               <a:t>4</a:t>
+            </a:fld>
+            <a:endParaRPr lang="fr-FR"/>
+          </a:p>
+        </p:txBody>
+      </p:sp>
+    </p:spTree>
+    <p:extLst>
+      <p:ext uri="{BB962C8B-B14F-4D97-AF65-F5344CB8AC3E}">
+        <p14:creationId xmlns:p14="http://schemas.microsoft.com/office/powerpoint/2010/main" val="2535700536"/>
+      </p:ext>
+    </p:extLst>
+  </p:cSld>
+  <p:clrMapOvr>
+    <a:masterClrMapping/>
+  </p:clrMapOvr>
+</p:notes>
+</file>
+
+<file path=ppt/notesSlides/notesSlide5.xml><?xml version="1.0" encoding="utf-8"?>
+<p:notes xmlns:a="http://schemas.openxmlformats.org/drawingml/2006/main" xmlns:r="http://schemas.openxmlformats.org/officeDocument/2006/relationships" xmlns:p="http://schemas.openxmlformats.org/presentationml/2006/main">
+  <p:cSld>
+    <p:spTree>
+      <p:nvGrpSpPr>
+        <p:cNvPr id="1" name=""/>
+        <p:cNvGrpSpPr/>
+        <p:nvPr/>
+      </p:nvGrpSpPr>
+      <p:grpSpPr>
+        <a:xfrm>
+          <a:off x="0" y="0"/>
+          <a:ext cx="0" cy="0"/>
+          <a:chOff x="0" y="0"/>
+          <a:chExt cx="0" cy="0"/>
+        </a:xfrm>
+      </p:grpSpPr>
+      <p:sp>
+        <p:nvSpPr>
+          <p:cNvPr id="2" name="Espace réservé de l'image des diapositives 1"/>
+          <p:cNvSpPr>
+            <a:spLocks noGrp="1" noRot="1" noChangeAspect="1"/>
+          </p:cNvSpPr>
+          <p:nvPr>
+            <p:ph type="sldImg"/>
+          </p:nvPr>
+        </p:nvSpPr>
+        <p:spPr/>
+      </p:sp>
+      <p:sp>
+        <p:nvSpPr>
+          <p:cNvPr id="3" name="Espace réservé des notes 2"/>
+          <p:cNvSpPr>
+            <a:spLocks noGrp="1"/>
+          </p:cNvSpPr>
+          <p:nvPr>
+            <p:ph type="body" idx="1"/>
+          </p:nvPr>
+        </p:nvSpPr>
+        <p:spPr/>
+        <p:txBody>
+          <a:bodyPr/>
+          <a:lstStyle/>
+          <a:p>
+            <a:r>
+              <a:rPr lang="fr-FR" dirty="0"/>
+              <a:t>Collections</a:t>
+            </a:r>
+          </a:p>
+          <a:p>
+            <a:r>
+              <a:rPr lang="fr-FR" dirty="0"/>
+              <a:t>Persistance des données avec MongoDB</a:t>
+            </a:r>
+          </a:p>
+        </p:txBody>
+      </p:sp>
+      <p:sp>
+        <p:nvSpPr>
+          <p:cNvPr id="4" name="Espace réservé du numéro de diapositive 3"/>
+          <p:cNvSpPr>
+            <a:spLocks noGrp="1"/>
+          </p:cNvSpPr>
+          <p:nvPr>
+            <p:ph type="sldNum" sz="quarter" idx="5"/>
+          </p:nvPr>
+        </p:nvSpPr>
+        <p:spPr/>
+        <p:txBody>
+          <a:bodyPr/>
+          <a:lstStyle/>
+          <a:p>
+            <a:fld id="{A5C5F6F7-2778-4174-AB5B-B167836FA54F}" type="slidenum">
+              <a:rPr lang="fr-FR" smtClean="0"/>
+              <a:t>5</a:t>
             </a:fld>
             <a:endParaRPr lang="fr-FR"/>
           </a:p>
@@ -4984,8 +5200,452 @@
           <a:p>
             <a:r>
               <a:rPr lang="fr-FR" dirty="0"/>
-              <a:t>Architecture technique</a:t>
-            </a:r>
+              <a:t>Architecture technique batch</a:t>
+            </a:r>
+          </a:p>
+        </p:txBody>
+      </p:sp>
+      <p:pic>
+        <p:nvPicPr>
+          <p:cNvPr id="4" name="Image 3">
+            <a:extLst>
+              <a:ext uri="{FF2B5EF4-FFF2-40B4-BE49-F238E27FC236}">
+                <a16:creationId xmlns:a16="http://schemas.microsoft.com/office/drawing/2014/main" id="{4BBA365F-0BD9-4D08-8483-F63CECBFB229}"/>
+              </a:ext>
+            </a:extLst>
+          </p:cNvPr>
+          <p:cNvPicPr>
+            <a:picLocks noChangeAspect="1"/>
+          </p:cNvPicPr>
+          <p:nvPr/>
+        </p:nvPicPr>
+        <p:blipFill>
+          <a:blip r:embed="rId3">
+            <a:extLst>
+              <a:ext uri="{28A0092B-C50C-407E-A947-70E740481C1C}">
+                <a14:useLocalDpi xmlns:a14="http://schemas.microsoft.com/office/drawing/2010/main" val="0"/>
+              </a:ext>
+            </a:extLst>
+          </a:blip>
+          <a:stretch>
+            <a:fillRect/>
+          </a:stretch>
+        </p:blipFill>
+        <p:spPr>
+          <a:xfrm>
+            <a:off x="1157895" y="3322316"/>
+            <a:ext cx="1517653" cy="1517653"/>
+          </a:xfrm>
+          <a:prstGeom prst="rect">
+            <a:avLst/>
+          </a:prstGeom>
+        </p:spPr>
+      </p:pic>
+      <p:pic>
+        <p:nvPicPr>
+          <p:cNvPr id="6" name="Image 5">
+            <a:extLst>
+              <a:ext uri="{FF2B5EF4-FFF2-40B4-BE49-F238E27FC236}">
+                <a16:creationId xmlns:a16="http://schemas.microsoft.com/office/drawing/2014/main" id="{3F1F6796-1BC2-6EE6-5F5F-52D9D80CB659}"/>
+              </a:ext>
+            </a:extLst>
+          </p:cNvPr>
+          <p:cNvPicPr>
+            <a:picLocks noChangeAspect="1"/>
+          </p:cNvPicPr>
+          <p:nvPr/>
+        </p:nvPicPr>
+        <p:blipFill>
+          <a:blip r:embed="rId4">
+            <a:extLst>
+              <a:ext uri="{28A0092B-C50C-407E-A947-70E740481C1C}">
+                <a14:useLocalDpi xmlns:a14="http://schemas.microsoft.com/office/drawing/2010/main" val="0"/>
+              </a:ext>
+            </a:extLst>
+          </a:blip>
+          <a:stretch>
+            <a:fillRect/>
+          </a:stretch>
+        </p:blipFill>
+        <p:spPr>
+          <a:xfrm>
+            <a:off x="4278316" y="3928321"/>
+            <a:ext cx="2443997" cy="946564"/>
+          </a:xfrm>
+          <a:prstGeom prst="rect">
+            <a:avLst/>
+          </a:prstGeom>
+        </p:spPr>
+      </p:pic>
+      <p:pic>
+        <p:nvPicPr>
+          <p:cNvPr id="8" name="Image 7">
+            <a:extLst>
+              <a:ext uri="{FF2B5EF4-FFF2-40B4-BE49-F238E27FC236}">
+                <a16:creationId xmlns:a16="http://schemas.microsoft.com/office/drawing/2014/main" id="{2C71649A-6036-9B73-5B6D-4F947D1E8D62}"/>
+              </a:ext>
+            </a:extLst>
+          </p:cNvPr>
+          <p:cNvPicPr>
+            <a:picLocks noChangeAspect="1"/>
+          </p:cNvPicPr>
+          <p:nvPr/>
+        </p:nvPicPr>
+        <p:blipFill>
+          <a:blip r:embed="rId5">
+            <a:extLst>
+              <a:ext uri="{28A0092B-C50C-407E-A947-70E740481C1C}">
+                <a14:useLocalDpi xmlns:a14="http://schemas.microsoft.com/office/drawing/2010/main" val="0"/>
+              </a:ext>
+            </a:extLst>
+          </a:blip>
+          <a:stretch>
+            <a:fillRect/>
+          </a:stretch>
+        </p:blipFill>
+        <p:spPr>
+          <a:xfrm>
+            <a:off x="8110687" y="3449799"/>
+            <a:ext cx="2443997" cy="1122918"/>
+          </a:xfrm>
+          <a:prstGeom prst="rect">
+            <a:avLst/>
+          </a:prstGeom>
+        </p:spPr>
+      </p:pic>
+      <p:pic>
+        <p:nvPicPr>
+          <p:cNvPr id="12" name="Image 11">
+            <a:extLst>
+              <a:ext uri="{FF2B5EF4-FFF2-40B4-BE49-F238E27FC236}">
+                <a16:creationId xmlns:a16="http://schemas.microsoft.com/office/drawing/2014/main" id="{D63B38BC-341B-EA70-CEDC-37C3010907A9}"/>
+              </a:ext>
+            </a:extLst>
+          </p:cNvPr>
+          <p:cNvPicPr>
+            <a:picLocks noChangeAspect="1"/>
+          </p:cNvPicPr>
+          <p:nvPr/>
+        </p:nvPicPr>
+        <p:blipFill>
+          <a:blip r:embed="rId6">
+            <a:extLst>
+              <a:ext uri="{28A0092B-C50C-407E-A947-70E740481C1C}">
+                <a14:useLocalDpi xmlns:a14="http://schemas.microsoft.com/office/drawing/2010/main" val="0"/>
+              </a:ext>
+            </a:extLst>
+          </a:blip>
+          <a:stretch>
+            <a:fillRect/>
+          </a:stretch>
+        </p:blipFill>
+        <p:spPr>
+          <a:xfrm>
+            <a:off x="7397254" y="1335519"/>
+            <a:ext cx="3657600" cy="990600"/>
+          </a:xfrm>
+          <a:prstGeom prst="rect">
+            <a:avLst/>
+          </a:prstGeom>
+        </p:spPr>
+      </p:pic>
+      <p:sp>
+        <p:nvSpPr>
+          <p:cNvPr id="3" name="Flèche : droite 2">
+            <a:extLst>
+              <a:ext uri="{FF2B5EF4-FFF2-40B4-BE49-F238E27FC236}">
+                <a16:creationId xmlns:a16="http://schemas.microsoft.com/office/drawing/2014/main" id="{8F209F53-6B10-2C97-0E4E-2E9E74ACF3B4}"/>
+              </a:ext>
+            </a:extLst>
+          </p:cNvPr>
+          <p:cNvSpPr/>
+          <p:nvPr/>
+        </p:nvSpPr>
+        <p:spPr>
+          <a:xfrm>
+            <a:off x="3110926" y="4081142"/>
+            <a:ext cx="798022" cy="561460"/>
+          </a:xfrm>
+          <a:prstGeom prst="rightArrow">
+            <a:avLst/>
+          </a:prstGeom>
+        </p:spPr>
+        <p:style>
+          <a:lnRef idx="2">
+            <a:schemeClr val="accent1">
+              <a:shade val="15000"/>
+            </a:schemeClr>
+          </a:lnRef>
+          <a:fillRef idx="1">
+            <a:schemeClr val="accent1"/>
+          </a:fillRef>
+          <a:effectRef idx="0">
+            <a:schemeClr val="accent1"/>
+          </a:effectRef>
+          <a:fontRef idx="minor">
+            <a:schemeClr val="lt1"/>
+          </a:fontRef>
+        </p:style>
+        <p:txBody>
+          <a:bodyPr rtlCol="0" anchor="ctr"/>
+          <a:lstStyle/>
+          <a:p>
+            <a:pPr algn="ctr"/>
+            <a:endParaRPr lang="fr-FR"/>
+          </a:p>
+        </p:txBody>
+      </p:sp>
+      <p:sp>
+        <p:nvSpPr>
+          <p:cNvPr id="5" name="Flèche : droite 4">
+            <a:extLst>
+              <a:ext uri="{FF2B5EF4-FFF2-40B4-BE49-F238E27FC236}">
+                <a16:creationId xmlns:a16="http://schemas.microsoft.com/office/drawing/2014/main" id="{196E8A7B-3DD2-6651-C43F-FC956EEE83AE}"/>
+              </a:ext>
+            </a:extLst>
+          </p:cNvPr>
+          <p:cNvSpPr/>
+          <p:nvPr/>
+        </p:nvSpPr>
+        <p:spPr>
+          <a:xfrm>
+            <a:off x="7017489" y="4059499"/>
+            <a:ext cx="798022" cy="561460"/>
+          </a:xfrm>
+          <a:prstGeom prst="rightArrow">
+            <a:avLst/>
+          </a:prstGeom>
+        </p:spPr>
+        <p:style>
+          <a:lnRef idx="2">
+            <a:schemeClr val="accent1">
+              <a:shade val="15000"/>
+            </a:schemeClr>
+          </a:lnRef>
+          <a:fillRef idx="1">
+            <a:schemeClr val="accent1"/>
+          </a:fillRef>
+          <a:effectRef idx="0">
+            <a:schemeClr val="accent1"/>
+          </a:effectRef>
+          <a:fontRef idx="minor">
+            <a:schemeClr val="lt1"/>
+          </a:fontRef>
+        </p:style>
+        <p:txBody>
+          <a:bodyPr rtlCol="0" anchor="ctr"/>
+          <a:lstStyle/>
+          <a:p>
+            <a:pPr algn="ctr"/>
+            <a:endParaRPr lang="fr-FR"/>
+          </a:p>
+        </p:txBody>
+      </p:sp>
+      <p:sp>
+        <p:nvSpPr>
+          <p:cNvPr id="7" name="Flèche : droite 6">
+            <a:extLst>
+              <a:ext uri="{FF2B5EF4-FFF2-40B4-BE49-F238E27FC236}">
+                <a16:creationId xmlns:a16="http://schemas.microsoft.com/office/drawing/2014/main" id="{6645C4FD-9100-A6FF-E432-56EF8910C7D3}"/>
+              </a:ext>
+            </a:extLst>
+          </p:cNvPr>
+          <p:cNvSpPr/>
+          <p:nvPr/>
+        </p:nvSpPr>
+        <p:spPr>
+          <a:xfrm rot="16200000">
+            <a:off x="8652944" y="2635092"/>
+            <a:ext cx="798022" cy="561460"/>
+          </a:xfrm>
+          <a:prstGeom prst="rightArrow">
+            <a:avLst/>
+          </a:prstGeom>
+        </p:spPr>
+        <p:style>
+          <a:lnRef idx="2">
+            <a:schemeClr val="accent1">
+              <a:shade val="15000"/>
+            </a:schemeClr>
+          </a:lnRef>
+          <a:fillRef idx="1">
+            <a:schemeClr val="accent1"/>
+          </a:fillRef>
+          <a:effectRef idx="0">
+            <a:schemeClr val="accent1"/>
+          </a:effectRef>
+          <a:fontRef idx="minor">
+            <a:schemeClr val="lt1"/>
+          </a:fontRef>
+        </p:style>
+        <p:txBody>
+          <a:bodyPr rtlCol="0" anchor="ctr"/>
+          <a:lstStyle/>
+          <a:p>
+            <a:pPr algn="ctr"/>
+            <a:endParaRPr lang="fr-FR"/>
+          </a:p>
+        </p:txBody>
+      </p:sp>
+      <p:sp>
+        <p:nvSpPr>
+          <p:cNvPr id="9" name="ZoneTexte 8">
+            <a:extLst>
+              <a:ext uri="{FF2B5EF4-FFF2-40B4-BE49-F238E27FC236}">
+                <a16:creationId xmlns:a16="http://schemas.microsoft.com/office/drawing/2014/main" id="{F5059026-B953-A02F-B746-8CEBA6BAD594}"/>
+              </a:ext>
+            </a:extLst>
+          </p:cNvPr>
+          <p:cNvSpPr txBox="1"/>
+          <p:nvPr/>
+        </p:nvSpPr>
+        <p:spPr>
+          <a:xfrm>
+            <a:off x="1223904" y="4717262"/>
+            <a:ext cx="1517653" cy="369332"/>
+          </a:xfrm>
+          <a:prstGeom prst="rect">
+            <a:avLst/>
+          </a:prstGeom>
+          <a:noFill/>
+        </p:spPr>
+        <p:txBody>
+          <a:bodyPr wrap="square" rtlCol="0">
+            <a:spAutoFit/>
+          </a:bodyPr>
+          <a:lstStyle/>
+          <a:p>
+            <a:r>
+              <a:rPr lang="fr-FR" dirty="0"/>
+              <a:t>Fichier local</a:t>
+            </a:r>
+          </a:p>
+        </p:txBody>
+      </p:sp>
+      <p:sp>
+        <p:nvSpPr>
+          <p:cNvPr id="10" name="ZoneTexte 9">
+            <a:extLst>
+              <a:ext uri="{FF2B5EF4-FFF2-40B4-BE49-F238E27FC236}">
+                <a16:creationId xmlns:a16="http://schemas.microsoft.com/office/drawing/2014/main" id="{F35408CF-EB77-0A81-1515-12AEBBF1D5B1}"/>
+              </a:ext>
+            </a:extLst>
+          </p:cNvPr>
+          <p:cNvSpPr txBox="1"/>
+          <p:nvPr/>
+        </p:nvSpPr>
+        <p:spPr>
+          <a:xfrm>
+            <a:off x="4464803" y="4775912"/>
+            <a:ext cx="2676226" cy="923330"/>
+          </a:xfrm>
+          <a:prstGeom prst="rect">
+            <a:avLst/>
+          </a:prstGeom>
+          <a:noFill/>
+        </p:spPr>
+        <p:txBody>
+          <a:bodyPr wrap="square" rtlCol="0">
+            <a:spAutoFit/>
+          </a:bodyPr>
+          <a:lstStyle/>
+          <a:p>
+            <a:r>
+              <a:rPr lang="fr-FR" dirty="0"/>
+              <a:t>1 </a:t>
+            </a:r>
+            <a:r>
+              <a:rPr lang="fr-FR" dirty="0" err="1"/>
+              <a:t>namenode</a:t>
+            </a:r>
+            <a:endParaRPr lang="fr-FR" dirty="0"/>
+          </a:p>
+          <a:p>
+            <a:r>
+              <a:rPr lang="fr-FR" dirty="0"/>
+              <a:t>1 </a:t>
+            </a:r>
+            <a:r>
+              <a:rPr lang="fr-FR" dirty="0" err="1"/>
+              <a:t>secondary</a:t>
+            </a:r>
+            <a:r>
+              <a:rPr lang="fr-FR" dirty="0"/>
+              <a:t> </a:t>
+            </a:r>
+            <a:r>
+              <a:rPr lang="fr-FR" dirty="0" err="1"/>
+              <a:t>namenode</a:t>
+            </a:r>
+            <a:endParaRPr lang="fr-FR" dirty="0"/>
+          </a:p>
+          <a:p>
+            <a:r>
+              <a:rPr lang="fr-FR" dirty="0"/>
+              <a:t>4 </a:t>
+            </a:r>
+            <a:r>
+              <a:rPr lang="fr-FR" dirty="0" err="1"/>
+              <a:t>datanodes</a:t>
+            </a:r>
+            <a:endParaRPr lang="fr-FR" dirty="0"/>
+          </a:p>
+        </p:txBody>
+      </p:sp>
+      <p:sp>
+        <p:nvSpPr>
+          <p:cNvPr id="11" name="ZoneTexte 10">
+            <a:extLst>
+              <a:ext uri="{FF2B5EF4-FFF2-40B4-BE49-F238E27FC236}">
+                <a16:creationId xmlns:a16="http://schemas.microsoft.com/office/drawing/2014/main" id="{EACB4A89-5B6C-DD43-ABEA-6D4BE70B00EA}"/>
+              </a:ext>
+            </a:extLst>
+          </p:cNvPr>
+          <p:cNvSpPr txBox="1"/>
+          <p:nvPr/>
+        </p:nvSpPr>
+        <p:spPr>
+          <a:xfrm>
+            <a:off x="8259072" y="4954102"/>
+            <a:ext cx="2295612" cy="923330"/>
+          </a:xfrm>
+          <a:prstGeom prst="rect">
+            <a:avLst/>
+          </a:prstGeom>
+          <a:noFill/>
+        </p:spPr>
+        <p:txBody>
+          <a:bodyPr wrap="square" rtlCol="0">
+            <a:spAutoFit/>
+          </a:bodyPr>
+          <a:lstStyle/>
+          <a:p>
+            <a:r>
+              <a:rPr lang="fr-FR" dirty="0"/>
+              <a:t>1 </a:t>
+            </a:r>
+            <a:r>
+              <a:rPr lang="fr-FR" dirty="0" err="1"/>
+              <a:t>spark</a:t>
+            </a:r>
+            <a:r>
+              <a:rPr lang="fr-FR" dirty="0"/>
+              <a:t>-master</a:t>
+            </a:r>
+          </a:p>
+          <a:p>
+            <a:r>
+              <a:rPr lang="fr-FR" dirty="0"/>
+              <a:t>4 </a:t>
+            </a:r>
+            <a:r>
+              <a:rPr lang="fr-FR" dirty="0" err="1"/>
+              <a:t>spark-workers</a:t>
+            </a:r>
+            <a:endParaRPr lang="fr-FR" dirty="0"/>
+          </a:p>
+          <a:p>
+            <a:endParaRPr lang="fr-FR" dirty="0"/>
           </a:p>
         </p:txBody>
       </p:sp>
@@ -5007,7 +5667,13 @@
   <p:cSld>
     <p:spTree>
       <p:nvGrpSpPr>
-        <p:cNvPr id="1" name=""/>
+        <p:cNvPr id="1" name="">
+          <a:extLst>
+            <a:ext uri="{FF2B5EF4-FFF2-40B4-BE49-F238E27FC236}">
+              <a16:creationId xmlns:a16="http://schemas.microsoft.com/office/drawing/2014/main" id="{BF0359A4-F2D8-97B9-A268-31CF20197346}"/>
+            </a:ext>
+          </a:extLst>
+        </p:cNvPr>
         <p:cNvGrpSpPr/>
         <p:nvPr/>
       </p:nvGrpSpPr>
@@ -5024,7 +5690,7 @@
           <p:cNvPr id="2" name="Titre 1">
             <a:extLst>
               <a:ext uri="{FF2B5EF4-FFF2-40B4-BE49-F238E27FC236}">
-                <a16:creationId xmlns:a16="http://schemas.microsoft.com/office/drawing/2014/main" id="{C9C9726D-14B1-CD24-5403-598F2CDD3CF6}"/>
+                <a16:creationId xmlns:a16="http://schemas.microsoft.com/office/drawing/2014/main" id="{45320E31-5C8B-E09B-5FD0-68E1512CBA20}"/>
               </a:ext>
             </a:extLst>
           </p:cNvPr>
@@ -5042,266 +5708,468 @@
           <a:p>
             <a:r>
               <a:rPr lang="fr-FR" dirty="0"/>
-              <a:t>Implémentation</a:t>
-            </a:r>
-          </a:p>
-        </p:txBody>
-      </p:sp>
-      <p:sp>
-        <p:nvSpPr>
-          <p:cNvPr id="3" name="Espace réservé du contenu 2">
+              <a:t>Architecture technique </a:t>
+            </a:r>
+            <a:r>
+              <a:rPr lang="fr-FR" dirty="0" err="1"/>
+              <a:t>stream</a:t>
+            </a:r>
+            <a:endParaRPr lang="fr-FR" dirty="0"/>
+          </a:p>
+        </p:txBody>
+      </p:sp>
+      <p:pic>
+        <p:nvPicPr>
+          <p:cNvPr id="4" name="Image 3">
             <a:extLst>
               <a:ext uri="{FF2B5EF4-FFF2-40B4-BE49-F238E27FC236}">
-                <a16:creationId xmlns:a16="http://schemas.microsoft.com/office/drawing/2014/main" id="{646596E6-2E1C-51CA-B0DC-B9B7701B9330}"/>
+                <a16:creationId xmlns:a16="http://schemas.microsoft.com/office/drawing/2014/main" id="{01A86485-A459-4CBF-F187-8FFBCCB9E4D2}"/>
               </a:ext>
             </a:extLst>
           </p:cNvPr>
-          <p:cNvSpPr>
-            <a:spLocks noGrp="1"/>
-          </p:cNvSpPr>
-          <p:nvPr>
-            <p:ph sz="half" idx="1"/>
-          </p:nvPr>
-        </p:nvSpPr>
+          <p:cNvPicPr>
+            <a:picLocks noChangeAspect="1"/>
+          </p:cNvPicPr>
+          <p:nvPr/>
+        </p:nvPicPr>
+        <p:blipFill>
+          <a:blip r:embed="rId3">
+            <a:extLst>
+              <a:ext uri="{28A0092B-C50C-407E-A947-70E740481C1C}">
+                <a14:useLocalDpi xmlns:a14="http://schemas.microsoft.com/office/drawing/2010/main" val="0"/>
+              </a:ext>
+            </a:extLst>
+          </a:blip>
+          <a:stretch>
+            <a:fillRect/>
+          </a:stretch>
+        </p:blipFill>
         <p:spPr>
           <a:xfrm>
-            <a:off x="1534695" y="2010877"/>
-            <a:ext cx="4608576" cy="3823865"/>
+            <a:off x="760368" y="3388785"/>
+            <a:ext cx="1517653" cy="1517653"/>
           </a:xfrm>
+          <a:prstGeom prst="rect">
+            <a:avLst/>
+          </a:prstGeom>
         </p:spPr>
-        <p:txBody>
-          <a:bodyPr>
-            <a:normAutofit fontScale="92500" lnSpcReduction="10000"/>
-          </a:bodyPr>
-          <a:lstStyle/>
-          <a:p>
-            <a:pPr marL="0" indent="0">
-              <a:spcBef>
-                <a:spcPts val="1125"/>
-              </a:spcBef>
-              <a:buNone/>
-            </a:pPr>
-            <a:r>
-              <a:rPr lang="fr-FR" b="1" dirty="0">
-                <a:effectLst/>
-              </a:rPr>
-              <a:t>Jobs Batch</a:t>
-            </a:r>
-          </a:p>
-          <a:p>
-            <a:pPr marL="0" indent="0">
-              <a:buNone/>
-            </a:pPr>
-            <a:r>
-              <a:rPr lang="fr-FR" dirty="0">
-                <a:effectLst/>
-                <a:latin typeface="Consolas" panose="020B0609020204030204" pitchFamily="49" charset="0"/>
-              </a:rPr>
-              <a:t>products_count.py:</a:t>
-            </a:r>
-          </a:p>
-          <a:p>
-            <a:pPr marL="0" indent="0">
-              <a:buNone/>
-            </a:pPr>
-            <a:r>
-              <a:rPr lang="fr-FR" sz="1700" dirty="0"/>
-              <a:t>- Analyse des produits les plus demandés</a:t>
-            </a:r>
-          </a:p>
-          <a:p>
-            <a:pPr marL="0" indent="0">
-              <a:buNone/>
-            </a:pPr>
-            <a:r>
-              <a:rPr lang="fr-FR" sz="1700" dirty="0"/>
-              <a:t>- Sauvegarder dans MongoDB</a:t>
-            </a:r>
-          </a:p>
-          <a:p>
-            <a:pPr marL="0" indent="0">
-              <a:buNone/>
-            </a:pPr>
-            <a:r>
-              <a:rPr lang="fr-FR" dirty="0">
-                <a:effectLst/>
-                <a:latin typeface="Consolas" panose="020B0609020204030204" pitchFamily="49" charset="0"/>
-              </a:rPr>
-              <a:t>status_count.py</a:t>
-            </a:r>
-          </a:p>
-          <a:p>
-            <a:pPr marL="0" indent="0">
-              <a:buNone/>
-            </a:pPr>
-            <a:r>
-              <a:rPr lang="fr-FR" sz="1700" dirty="0"/>
-              <a:t>- Analyse des codes HTTP par heure</a:t>
-            </a:r>
-          </a:p>
-          <a:p>
-            <a:pPr marL="0" indent="0">
-              <a:buNone/>
-            </a:pPr>
-            <a:r>
-              <a:rPr lang="fr-FR" sz="1700" dirty="0"/>
-              <a:t>- Sauvegarder dans MongoDB</a:t>
-            </a:r>
-          </a:p>
-          <a:p>
-            <a:pPr marL="0" indent="0">
-              <a:buNone/>
-            </a:pPr>
-            <a:endParaRPr lang="fr-FR" dirty="0"/>
-          </a:p>
-        </p:txBody>
-      </p:sp>
-      <p:sp>
-        <p:nvSpPr>
-          <p:cNvPr id="4" name="Espace réservé du contenu 3">
+      </p:pic>
+      <p:pic>
+        <p:nvPicPr>
+          <p:cNvPr id="8" name="Image 7">
             <a:extLst>
               <a:ext uri="{FF2B5EF4-FFF2-40B4-BE49-F238E27FC236}">
-                <a16:creationId xmlns:a16="http://schemas.microsoft.com/office/drawing/2014/main" id="{C8054189-6C4B-15F9-CDE6-E4B0E8C8BA50}"/>
+                <a16:creationId xmlns:a16="http://schemas.microsoft.com/office/drawing/2014/main" id="{53A0D564-E00F-7181-A161-3FC24B81D8E5}"/>
               </a:ext>
             </a:extLst>
           </p:cNvPr>
-          <p:cNvSpPr>
-            <a:spLocks noGrp="1"/>
-          </p:cNvSpPr>
-          <p:nvPr>
-            <p:ph sz="half" idx="2"/>
-          </p:nvPr>
-        </p:nvSpPr>
+          <p:cNvPicPr>
+            <a:picLocks noChangeAspect="1"/>
+          </p:cNvPicPr>
+          <p:nvPr/>
+        </p:nvPicPr>
+        <p:blipFill>
+          <a:blip r:embed="rId4">
+            <a:extLst>
+              <a:ext uri="{28A0092B-C50C-407E-A947-70E740481C1C}">
+                <a14:useLocalDpi xmlns:a14="http://schemas.microsoft.com/office/drawing/2010/main" val="0"/>
+              </a:ext>
+            </a:extLst>
+          </a:blip>
+          <a:stretch>
+            <a:fillRect/>
+          </a:stretch>
+        </p:blipFill>
         <p:spPr>
           <a:xfrm>
-            <a:off x="6454793" y="2017343"/>
-            <a:ext cx="4604130" cy="3817400"/>
+            <a:off x="7771898" y="3549410"/>
+            <a:ext cx="2443997" cy="1122918"/>
           </a:xfrm>
+          <a:prstGeom prst="rect">
+            <a:avLst/>
+          </a:prstGeom>
         </p:spPr>
-        <p:txBody>
-          <a:bodyPr>
-            <a:normAutofit fontScale="92500" lnSpcReduction="10000"/>
+      </p:pic>
+      <p:pic>
+        <p:nvPicPr>
+          <p:cNvPr id="12" name="Image 11">
+            <a:extLst>
+              <a:ext uri="{FF2B5EF4-FFF2-40B4-BE49-F238E27FC236}">
+                <a16:creationId xmlns:a16="http://schemas.microsoft.com/office/drawing/2014/main" id="{A57F99AF-137B-10A3-101B-9449DE56E247}"/>
+              </a:ext>
+            </a:extLst>
+          </p:cNvPr>
+          <p:cNvPicPr>
+            <a:picLocks noChangeAspect="1"/>
+          </p:cNvPicPr>
+          <p:nvPr/>
+        </p:nvPicPr>
+        <p:blipFill>
+          <a:blip r:embed="rId5">
+            <a:extLst>
+              <a:ext uri="{28A0092B-C50C-407E-A947-70E740481C1C}">
+                <a14:useLocalDpi xmlns:a14="http://schemas.microsoft.com/office/drawing/2010/main" val="0"/>
+              </a:ext>
+            </a:extLst>
+          </a:blip>
+          <a:stretch>
+            <a:fillRect/>
+          </a:stretch>
+        </p:blipFill>
+        <p:spPr>
+          <a:xfrm>
+            <a:off x="7600454" y="1005075"/>
+            <a:ext cx="3657600" cy="990600"/>
+          </a:xfrm>
+          <a:prstGeom prst="rect">
+            <a:avLst/>
+          </a:prstGeom>
+        </p:spPr>
+      </p:pic>
+      <p:pic>
+        <p:nvPicPr>
+          <p:cNvPr id="5" name="Image 4">
+            <a:extLst>
+              <a:ext uri="{FF2B5EF4-FFF2-40B4-BE49-F238E27FC236}">
+                <a16:creationId xmlns:a16="http://schemas.microsoft.com/office/drawing/2014/main" id="{DB6BD979-2795-0018-D950-9274E857ED83}"/>
+              </a:ext>
+            </a:extLst>
+          </p:cNvPr>
+          <p:cNvPicPr>
+            <a:picLocks noChangeAspect="1"/>
+          </p:cNvPicPr>
+          <p:nvPr/>
+        </p:nvPicPr>
+        <p:blipFill>
+          <a:blip r:embed="rId6">
+            <a:extLst>
+              <a:ext uri="{28A0092B-C50C-407E-A947-70E740481C1C}">
+                <a14:useLocalDpi xmlns:a14="http://schemas.microsoft.com/office/drawing/2010/main" val="0"/>
+              </a:ext>
+            </a:extLst>
+          </a:blip>
+          <a:stretch>
+            <a:fillRect/>
+          </a:stretch>
+        </p:blipFill>
+        <p:spPr>
+          <a:xfrm>
+            <a:off x="3595499" y="3128196"/>
+            <a:ext cx="2234020" cy="1355747"/>
+          </a:xfrm>
+          <a:prstGeom prst="rect">
+            <a:avLst/>
+          </a:prstGeom>
+        </p:spPr>
+      </p:pic>
+      <p:sp>
+        <p:nvSpPr>
+          <p:cNvPr id="6" name="ZoneTexte 5">
+            <a:extLst>
+              <a:ext uri="{FF2B5EF4-FFF2-40B4-BE49-F238E27FC236}">
+                <a16:creationId xmlns:a16="http://schemas.microsoft.com/office/drawing/2014/main" id="{4250428D-7CE5-0BE3-A6E9-48A1B09288E7}"/>
+              </a:ext>
+            </a:extLst>
+          </p:cNvPr>
+          <p:cNvSpPr txBox="1"/>
+          <p:nvPr/>
+        </p:nvSpPr>
+        <p:spPr>
+          <a:xfrm>
+            <a:off x="504763" y="4857781"/>
+            <a:ext cx="2467429" cy="369332"/>
+          </a:xfrm>
+          <a:prstGeom prst="rect">
+            <a:avLst/>
+          </a:prstGeom>
+          <a:noFill/>
+        </p:spPr>
+        <p:txBody>
+          <a:bodyPr wrap="square" rtlCol="0">
+            <a:spAutoFit/>
           </a:bodyPr>
           <a:lstStyle/>
           <a:p>
-            <a:pPr marL="0" indent="0">
-              <a:spcBef>
-                <a:spcPts val="1125"/>
-              </a:spcBef>
-              <a:buNone/>
-            </a:pPr>
-            <a:r>
-              <a:rPr lang="fr-FR" b="1" dirty="0">
-                <a:effectLst/>
-              </a:rPr>
-              <a:t>Jobs Streaming</a:t>
-            </a:r>
-          </a:p>
-          <a:p>
-            <a:pPr marL="0" indent="0">
-              <a:buNone/>
-            </a:pPr>
-            <a:r>
-              <a:rPr lang="fr-FR" dirty="0">
-                <a:effectLst/>
-                <a:latin typeface="Consolas" panose="020B0609020204030204" pitchFamily="49" charset="0"/>
-              </a:rPr>
-              <a:t>stream_job1.py</a:t>
-            </a:r>
-          </a:p>
-          <a:p>
-            <a:pPr marL="0" indent="0">
-              <a:buNone/>
-            </a:pPr>
-            <a:r>
-              <a:rPr lang="fr-FR" sz="1700" dirty="0"/>
-              <a:t>- Surveillance de l'activité IP</a:t>
-            </a:r>
-          </a:p>
-          <a:p>
-            <a:pPr marL="0" indent="0">
-              <a:buNone/>
-            </a:pPr>
-            <a:r>
-              <a:rPr lang="fr-FR" sz="1700" dirty="0"/>
-              <a:t>- Fenêtres temporelles de 2 minutes, </a:t>
-            </a:r>
-            <a:r>
-              <a:rPr lang="fr-FR" sz="1700" dirty="0" err="1"/>
-              <a:t>sliding</a:t>
-            </a:r>
-            <a:r>
-              <a:rPr lang="fr-FR" sz="1700" dirty="0"/>
-              <a:t> </a:t>
-            </a:r>
-            <a:r>
-              <a:rPr lang="fr-FR" sz="1700" dirty="0" err="1"/>
-              <a:t>interval</a:t>
-            </a:r>
-            <a:r>
-              <a:rPr lang="fr-FR" sz="1700" dirty="0"/>
-              <a:t> 2 minutes</a:t>
-            </a:r>
-          </a:p>
-          <a:p>
-            <a:pPr marL="0" indent="0">
-              <a:buNone/>
-            </a:pPr>
-            <a:r>
-              <a:rPr lang="fr-FR" dirty="0">
-                <a:effectLst/>
-                <a:latin typeface="Consolas" panose="020B0609020204030204" pitchFamily="49" charset="0"/>
-              </a:rPr>
-              <a:t>streamErreur.py</a:t>
-            </a:r>
-          </a:p>
-          <a:p>
-            <a:pPr marL="0" indent="0">
-              <a:buNone/>
-            </a:pPr>
-            <a:r>
-              <a:rPr lang="fr-FR" sz="1700" dirty="0"/>
-              <a:t>- Détection des pics d'erreurs (404/500)</a:t>
-            </a:r>
-          </a:p>
-          <a:p>
-            <a:pPr marL="0" indent="0">
-              <a:buNone/>
-            </a:pPr>
-            <a:r>
-              <a:rPr lang="fr-FR" sz="1700" dirty="0"/>
-              <a:t>- Fenêtres temporelles de 2 minutes, </a:t>
-            </a:r>
-            <a:r>
-              <a:rPr lang="fr-FR" sz="1700" dirty="0" err="1"/>
-              <a:t>sliding</a:t>
-            </a:r>
-            <a:r>
-              <a:rPr lang="fr-FR" sz="1700" dirty="0"/>
-              <a:t> </a:t>
-            </a:r>
-            <a:r>
-              <a:rPr lang="fr-FR" sz="1700" dirty="0" err="1"/>
-              <a:t>interval</a:t>
-            </a:r>
-            <a:r>
-              <a:rPr lang="fr-FR" sz="1700" dirty="0"/>
-              <a:t> 2 minutes</a:t>
-            </a:r>
-          </a:p>
-          <a:p>
-            <a:pPr marL="0" indent="0">
-              <a:buNone/>
-            </a:pPr>
-            <a:r>
-              <a:rPr lang="fr-FR" sz="1700" dirty="0"/>
-              <a:t>- Seuils d'alerte</a:t>
-            </a:r>
-          </a:p>
-          <a:p>
-            <a:pPr marL="0" indent="0">
-              <a:buNone/>
-            </a:pPr>
+            <a:r>
+              <a:rPr lang="fr-FR" dirty="0"/>
+              <a:t>data-generator.py</a:t>
+            </a:r>
+          </a:p>
+        </p:txBody>
+      </p:sp>
+      <p:sp>
+        <p:nvSpPr>
+          <p:cNvPr id="7" name="Flèche : droite 6">
+            <a:extLst>
+              <a:ext uri="{FF2B5EF4-FFF2-40B4-BE49-F238E27FC236}">
+                <a16:creationId xmlns:a16="http://schemas.microsoft.com/office/drawing/2014/main" id="{B3991120-E781-B6ED-42DC-4926985819CF}"/>
+              </a:ext>
+            </a:extLst>
+          </p:cNvPr>
+          <p:cNvSpPr/>
+          <p:nvPr/>
+        </p:nvSpPr>
+        <p:spPr>
+          <a:xfrm>
+            <a:off x="2562848" y="4147611"/>
+            <a:ext cx="798022" cy="561460"/>
+          </a:xfrm>
+          <a:prstGeom prst="rightArrow">
+            <a:avLst/>
+          </a:prstGeom>
+        </p:spPr>
+        <p:style>
+          <a:lnRef idx="2">
+            <a:schemeClr val="accent1">
+              <a:shade val="15000"/>
+            </a:schemeClr>
+          </a:lnRef>
+          <a:fillRef idx="1">
+            <a:schemeClr val="accent1"/>
+          </a:fillRef>
+          <a:effectRef idx="0">
+            <a:schemeClr val="accent1"/>
+          </a:effectRef>
+          <a:fontRef idx="minor">
+            <a:schemeClr val="lt1"/>
+          </a:fontRef>
+        </p:style>
+        <p:txBody>
+          <a:bodyPr rtlCol="0" anchor="ctr"/>
+          <a:lstStyle/>
+          <a:p>
+            <a:pPr algn="ctr"/>
+            <a:endParaRPr lang="fr-FR"/>
+          </a:p>
+        </p:txBody>
+      </p:sp>
+      <p:sp>
+        <p:nvSpPr>
+          <p:cNvPr id="9" name="Flèche : droite 8">
+            <a:extLst>
+              <a:ext uri="{FF2B5EF4-FFF2-40B4-BE49-F238E27FC236}">
+                <a16:creationId xmlns:a16="http://schemas.microsoft.com/office/drawing/2014/main" id="{B7666AB1-862D-C721-E419-D567F46BB6B7}"/>
+              </a:ext>
+            </a:extLst>
+          </p:cNvPr>
+          <p:cNvSpPr/>
+          <p:nvPr/>
+        </p:nvSpPr>
+        <p:spPr>
+          <a:xfrm>
+            <a:off x="6081116" y="4072574"/>
+            <a:ext cx="887549" cy="561460"/>
+          </a:xfrm>
+          <a:prstGeom prst="rightArrow">
+            <a:avLst/>
+          </a:prstGeom>
+        </p:spPr>
+        <p:style>
+          <a:lnRef idx="2">
+            <a:schemeClr val="accent1">
+              <a:shade val="15000"/>
+            </a:schemeClr>
+          </a:lnRef>
+          <a:fillRef idx="1">
+            <a:schemeClr val="accent1"/>
+          </a:fillRef>
+          <a:effectRef idx="0">
+            <a:schemeClr val="accent1"/>
+          </a:effectRef>
+          <a:fontRef idx="minor">
+            <a:schemeClr val="lt1"/>
+          </a:fontRef>
+        </p:style>
+        <p:txBody>
+          <a:bodyPr rtlCol="0" anchor="ctr"/>
+          <a:lstStyle/>
+          <a:p>
+            <a:pPr algn="ctr"/>
+            <a:endParaRPr lang="fr-FR" dirty="0"/>
+          </a:p>
+        </p:txBody>
+      </p:sp>
+      <p:pic>
+        <p:nvPicPr>
+          <p:cNvPr id="14" name="Image 13">
+            <a:extLst>
+              <a:ext uri="{FF2B5EF4-FFF2-40B4-BE49-F238E27FC236}">
+                <a16:creationId xmlns:a16="http://schemas.microsoft.com/office/drawing/2014/main" id="{C9B69D23-FB4A-3924-FCD8-35B4DEEF499B}"/>
+              </a:ext>
+            </a:extLst>
+          </p:cNvPr>
+          <p:cNvPicPr>
+            <a:picLocks noChangeAspect="1"/>
+          </p:cNvPicPr>
+          <p:nvPr/>
+        </p:nvPicPr>
+        <p:blipFill>
+          <a:blip r:embed="rId7">
+            <a:extLst>
+              <a:ext uri="{28A0092B-C50C-407E-A947-70E740481C1C}">
+                <a14:useLocalDpi xmlns:a14="http://schemas.microsoft.com/office/drawing/2010/main" val="0"/>
+              </a:ext>
+            </a:extLst>
+          </a:blip>
+          <a:stretch>
+            <a:fillRect/>
+          </a:stretch>
+        </p:blipFill>
+        <p:spPr>
+          <a:xfrm>
+            <a:off x="3924262" y="4353304"/>
+            <a:ext cx="1628431" cy="881218"/>
+          </a:xfrm>
+          <a:prstGeom prst="rect">
+            <a:avLst/>
+          </a:prstGeom>
+        </p:spPr>
+      </p:pic>
+      <p:sp>
+        <p:nvSpPr>
+          <p:cNvPr id="15" name="Flèche : droite 14">
+            <a:extLst>
+              <a:ext uri="{FF2B5EF4-FFF2-40B4-BE49-F238E27FC236}">
+                <a16:creationId xmlns:a16="http://schemas.microsoft.com/office/drawing/2014/main" id="{76355EEE-9AB9-AAB3-B6F4-49E9B1FB3BD3}"/>
+              </a:ext>
+            </a:extLst>
+          </p:cNvPr>
+          <p:cNvSpPr/>
+          <p:nvPr/>
+        </p:nvSpPr>
+        <p:spPr>
+          <a:xfrm rot="16200000">
+            <a:off x="8579150" y="2451540"/>
+            <a:ext cx="887549" cy="561460"/>
+          </a:xfrm>
+          <a:prstGeom prst="rightArrow">
+            <a:avLst/>
+          </a:prstGeom>
+        </p:spPr>
+        <p:style>
+          <a:lnRef idx="2">
+            <a:schemeClr val="accent1">
+              <a:shade val="15000"/>
+            </a:schemeClr>
+          </a:lnRef>
+          <a:fillRef idx="1">
+            <a:schemeClr val="accent1"/>
+          </a:fillRef>
+          <a:effectRef idx="0">
+            <a:schemeClr val="accent1"/>
+          </a:effectRef>
+          <a:fontRef idx="minor">
+            <a:schemeClr val="lt1"/>
+          </a:fontRef>
+        </p:style>
+        <p:txBody>
+          <a:bodyPr rtlCol="0" anchor="ctr"/>
+          <a:lstStyle/>
+          <a:p>
+            <a:pPr algn="ctr"/>
+            <a:endParaRPr lang="fr-FR" dirty="0"/>
+          </a:p>
+        </p:txBody>
+      </p:sp>
+      <p:sp>
+        <p:nvSpPr>
+          <p:cNvPr id="16" name="ZoneTexte 15">
+            <a:extLst>
+              <a:ext uri="{FF2B5EF4-FFF2-40B4-BE49-F238E27FC236}">
+                <a16:creationId xmlns:a16="http://schemas.microsoft.com/office/drawing/2014/main" id="{CEFA22F8-7181-CEE5-1672-0352D4CA3FDB}"/>
+              </a:ext>
+            </a:extLst>
+          </p:cNvPr>
+          <p:cNvSpPr txBox="1"/>
+          <p:nvPr/>
+        </p:nvSpPr>
+        <p:spPr>
+          <a:xfrm>
+            <a:off x="3632523" y="5385885"/>
+            <a:ext cx="2399082" cy="646331"/>
+          </a:xfrm>
+          <a:prstGeom prst="rect">
+            <a:avLst/>
+          </a:prstGeom>
+          <a:noFill/>
+        </p:spPr>
+        <p:txBody>
+          <a:bodyPr wrap="square" rtlCol="0">
+            <a:spAutoFit/>
+          </a:bodyPr>
+          <a:lstStyle/>
+          <a:p>
+            <a:r>
+              <a:rPr lang="fr-FR" dirty="0"/>
+              <a:t>1 conteneur Kafka</a:t>
+            </a:r>
+          </a:p>
+          <a:p>
+            <a:r>
+              <a:rPr lang="fr-FR" dirty="0"/>
+              <a:t>1 </a:t>
+            </a:r>
+            <a:r>
+              <a:rPr lang="fr-FR" dirty="0" err="1"/>
+              <a:t>zookeeper</a:t>
+            </a:r>
+            <a:endParaRPr lang="fr-FR" dirty="0"/>
+          </a:p>
+        </p:txBody>
+      </p:sp>
+      <p:sp>
+        <p:nvSpPr>
+          <p:cNvPr id="17" name="ZoneTexte 16">
+            <a:extLst>
+              <a:ext uri="{FF2B5EF4-FFF2-40B4-BE49-F238E27FC236}">
+                <a16:creationId xmlns:a16="http://schemas.microsoft.com/office/drawing/2014/main" id="{0BDDB900-35D0-A4E2-D022-31A52BE9F8C0}"/>
+              </a:ext>
+            </a:extLst>
+          </p:cNvPr>
+          <p:cNvSpPr txBox="1"/>
+          <p:nvPr/>
+        </p:nvSpPr>
+        <p:spPr>
+          <a:xfrm>
+            <a:off x="8155849" y="5014028"/>
+            <a:ext cx="2295612" cy="923330"/>
+          </a:xfrm>
+          <a:prstGeom prst="rect">
+            <a:avLst/>
+          </a:prstGeom>
+          <a:noFill/>
+        </p:spPr>
+        <p:txBody>
+          <a:bodyPr wrap="square" rtlCol="0">
+            <a:spAutoFit/>
+          </a:bodyPr>
+          <a:lstStyle/>
+          <a:p>
+            <a:r>
+              <a:rPr lang="fr-FR" dirty="0"/>
+              <a:t>1 </a:t>
+            </a:r>
+            <a:r>
+              <a:rPr lang="fr-FR" dirty="0" err="1"/>
+              <a:t>spark</a:t>
+            </a:r>
+            <a:r>
+              <a:rPr lang="fr-FR" dirty="0"/>
+              <a:t>-master</a:t>
+            </a:r>
+          </a:p>
+          <a:p>
+            <a:r>
+              <a:rPr lang="fr-FR" dirty="0"/>
+              <a:t>4 </a:t>
+            </a:r>
+            <a:r>
+              <a:rPr lang="fr-FR" dirty="0" err="1"/>
+              <a:t>spark-workers</a:t>
+            </a:r>
+            <a:endParaRPr lang="fr-FR" dirty="0"/>
+          </a:p>
+          <a:p>
             <a:endParaRPr lang="fr-FR" dirty="0"/>
           </a:p>
         </p:txBody>
@@ -5309,7 +6177,7 @@
     </p:spTree>
     <p:extLst>
       <p:ext uri="{BB962C8B-B14F-4D97-AF65-F5344CB8AC3E}">
-        <p14:creationId xmlns:p14="http://schemas.microsoft.com/office/powerpoint/2010/main" val="2761359753"/>
+        <p14:creationId xmlns:p14="http://schemas.microsoft.com/office/powerpoint/2010/main" val="3257047423"/>
       </p:ext>
     </p:extLst>
   </p:cSld>
@@ -5341,7 +6209,7 @@
           <p:cNvPr id="2" name="Titre 1">
             <a:extLst>
               <a:ext uri="{FF2B5EF4-FFF2-40B4-BE49-F238E27FC236}">
-                <a16:creationId xmlns:a16="http://schemas.microsoft.com/office/drawing/2014/main" id="{A4587044-671D-9466-CC9B-E8159756AE4D}"/>
+                <a16:creationId xmlns:a16="http://schemas.microsoft.com/office/drawing/2014/main" id="{C9C9726D-14B1-CD24-5403-598F2CDD3CF6}"/>
               </a:ext>
             </a:extLst>
           </p:cNvPr>
@@ -5354,22 +6222,22 @@
         </p:nvSpPr>
         <p:spPr/>
         <p:txBody>
-          <a:bodyPr anchor="ctr"/>
+          <a:bodyPr anchor="t"/>
           <a:lstStyle/>
           <a:p>
             <a:r>
               <a:rPr lang="fr-FR" dirty="0"/>
-              <a:t>Structure MongoDB</a:t>
-            </a:r>
-          </a:p>
-        </p:txBody>
-      </p:sp>
-      <p:sp>
-        <p:nvSpPr>
-          <p:cNvPr id="6" name="Espace réservé du contenu 5">
+              <a:t>Implémentation</a:t>
+            </a:r>
+          </a:p>
+        </p:txBody>
+      </p:sp>
+      <p:sp>
+        <p:nvSpPr>
+          <p:cNvPr id="3" name="Espace réservé du contenu 2">
             <a:extLst>
               <a:ext uri="{FF2B5EF4-FFF2-40B4-BE49-F238E27FC236}">
-                <a16:creationId xmlns:a16="http://schemas.microsoft.com/office/drawing/2014/main" id="{866F2135-C47F-DB5C-3F57-5ACA0CE2E9A2}"/>
+                <a16:creationId xmlns:a16="http://schemas.microsoft.com/office/drawing/2014/main" id="{646596E6-2E1C-51CA-B0DC-B9B7701B9330}"/>
               </a:ext>
             </a:extLst>
           </p:cNvPr>
@@ -5382,211 +6250,88 @@
         </p:nvSpPr>
         <p:spPr>
           <a:xfrm>
-            <a:off x="1534695" y="2010878"/>
-            <a:ext cx="4608576" cy="3772702"/>
+            <a:off x="1534695" y="2010877"/>
+            <a:ext cx="4608576" cy="3823865"/>
           </a:xfrm>
         </p:spPr>
         <p:txBody>
           <a:bodyPr>
-            <a:normAutofit fontScale="25000" lnSpcReduction="20000"/>
+            <a:normAutofit fontScale="92500" lnSpcReduction="10000"/>
           </a:bodyPr>
           <a:lstStyle/>
           <a:p>
             <a:pPr marL="0" indent="0">
               <a:spcBef>
-                <a:spcPts val="0"/>
+                <a:spcPts val="1125"/>
               </a:spcBef>
               <a:buNone/>
             </a:pPr>
             <a:r>
-              <a:rPr lang="fr-FR" sz="7200" dirty="0"/>
-              <a:t>logs.products_count {</a:t>
+              <a:rPr lang="fr-FR" b="1" dirty="0">
+                <a:effectLst/>
+              </a:rPr>
+              <a:t>Jobs Batch</a:t>
             </a:r>
           </a:p>
           <a:p>
             <a:pPr marL="0" indent="0">
-              <a:spcBef>
-                <a:spcPts val="0"/>
-              </a:spcBef>
               <a:buNone/>
             </a:pPr>
             <a:r>
-              <a:rPr lang="fr-FR" sz="7200" dirty="0"/>
-              <a:t>    "Name": "</a:t>
-            </a:r>
-            <a:r>
-              <a:rPr lang="fr-FR" sz="7200" dirty="0" err="1"/>
-              <a:t>product_name</a:t>
-            </a:r>
-            <a:r>
-              <a:rPr lang="fr-FR" sz="7200" dirty="0"/>
-              <a:t>",</a:t>
+              <a:rPr lang="fr-FR" dirty="0">
+                <a:effectLst/>
+                <a:latin typeface="Consolas" panose="020B0609020204030204" pitchFamily="49" charset="0"/>
+              </a:rPr>
+              <a:t>products_count.py:</a:t>
             </a:r>
           </a:p>
           <a:p>
             <a:pPr marL="0" indent="0">
-              <a:spcBef>
-                <a:spcPts val="0"/>
-              </a:spcBef>
               <a:buNone/>
             </a:pPr>
             <a:r>
-              <a:rPr lang="fr-FR" sz="7200" dirty="0"/>
-              <a:t>    "ID": "</a:t>
-            </a:r>
-            <a:r>
-              <a:rPr lang="fr-FR" sz="7200" dirty="0" err="1"/>
-              <a:t>product_id</a:t>
-            </a:r>
-            <a:r>
-              <a:rPr lang="fr-FR" sz="7200" dirty="0"/>
-              <a:t>",</a:t>
+              <a:rPr lang="fr-FR" sz="1700" dirty="0"/>
+              <a:t>- Analyse des produits les plus demandés</a:t>
             </a:r>
           </a:p>
           <a:p>
             <a:pPr marL="0" indent="0">
-              <a:spcBef>
-                <a:spcPts val="0"/>
-              </a:spcBef>
               <a:buNone/>
             </a:pPr>
             <a:r>
-              <a:rPr lang="fr-FR" sz="7200" dirty="0"/>
-              <a:t>    "count": </a:t>
-            </a:r>
-            <a:r>
-              <a:rPr lang="fr-FR" sz="7200" dirty="0" err="1"/>
-              <a:t>number</a:t>
-            </a:r>
-            <a:endParaRPr lang="fr-FR" sz="7200" dirty="0"/>
+              <a:rPr lang="fr-FR" sz="1700" dirty="0"/>
+              <a:t>- Sauvegarder dans MongoDB</a:t>
+            </a:r>
           </a:p>
           <a:p>
             <a:pPr marL="0" indent="0">
-              <a:spcBef>
-                <a:spcPts val="0"/>
-              </a:spcBef>
               <a:buNone/>
             </a:pPr>
             <a:r>
-              <a:rPr lang="fr-FR" sz="7200" dirty="0"/>
-              <a:t>}</a:t>
+              <a:rPr lang="fr-FR" dirty="0">
+                <a:effectLst/>
+                <a:latin typeface="Consolas" panose="020B0609020204030204" pitchFamily="49" charset="0"/>
+              </a:rPr>
+              <a:t>status_count.py</a:t>
             </a:r>
           </a:p>
           <a:p>
             <a:pPr marL="0" indent="0">
-              <a:spcBef>
-                <a:spcPts val="0"/>
-              </a:spcBef>
               <a:buNone/>
             </a:pPr>
-            <a:endParaRPr lang="fr-FR" sz="7200" dirty="0"/>
+            <a:r>
+              <a:rPr lang="fr-FR" sz="1700" dirty="0"/>
+              <a:t>- Analyse des codes HTTP par heure</a:t>
+            </a:r>
           </a:p>
           <a:p>
             <a:pPr marL="0" indent="0">
-              <a:spcBef>
-                <a:spcPts val="0"/>
-              </a:spcBef>
               <a:buNone/>
             </a:pPr>
             <a:r>
-              <a:rPr lang="fr-FR" sz="7200" dirty="0" err="1"/>
-              <a:t>logs.status_count</a:t>
-            </a:r>
-            <a:r>
-              <a:rPr lang="fr-FR" sz="7200" dirty="0"/>
-              <a:t> {</a:t>
-            </a:r>
-          </a:p>
-          <a:p>
-            <a:pPr marL="0" indent="0">
-              <a:spcBef>
-                <a:spcPts val="0"/>
-              </a:spcBef>
-              <a:buNone/>
-            </a:pPr>
-            <a:r>
-              <a:rPr lang="fr-FR" sz="7200" dirty="0"/>
-              <a:t>    "</a:t>
-            </a:r>
-            <a:r>
-              <a:rPr lang="fr-FR" sz="7200" dirty="0" err="1"/>
-              <a:t>window</a:t>
-            </a:r>
-            <a:r>
-              <a:rPr lang="fr-FR" sz="7200" dirty="0"/>
-              <a:t>": {</a:t>
-            </a:r>
-          </a:p>
-          <a:p>
-            <a:pPr marL="0" indent="0">
-              <a:spcBef>
-                <a:spcPts val="0"/>
-              </a:spcBef>
-              <a:buNone/>
-            </a:pPr>
-            <a:r>
-              <a:rPr lang="fr-FR" sz="7200" dirty="0"/>
-              <a:t>        "start": timestamp,</a:t>
-            </a:r>
-          </a:p>
-          <a:p>
-            <a:pPr marL="0" indent="0">
-              <a:spcBef>
-                <a:spcPts val="0"/>
-              </a:spcBef>
-              <a:buNone/>
-            </a:pPr>
-            <a:r>
-              <a:rPr lang="fr-FR" sz="7200" dirty="0"/>
-              <a:t>        "end": timestamp</a:t>
-            </a:r>
-          </a:p>
-          <a:p>
-            <a:pPr marL="0" indent="0">
-              <a:spcBef>
-                <a:spcPts val="0"/>
-              </a:spcBef>
-              <a:buNone/>
-            </a:pPr>
-            <a:r>
-              <a:rPr lang="fr-FR" sz="7200" dirty="0"/>
-              <a:t>    },</a:t>
-            </a:r>
-          </a:p>
-          <a:p>
-            <a:pPr marL="0" indent="0">
-              <a:spcBef>
-                <a:spcPts val="0"/>
-              </a:spcBef>
-              <a:buNone/>
-            </a:pPr>
-            <a:r>
-              <a:rPr lang="fr-FR" sz="7200" dirty="0"/>
-              <a:t>    "</a:t>
-            </a:r>
-            <a:r>
-              <a:rPr lang="fr-FR" sz="7200" dirty="0" err="1"/>
-              <a:t>status_code</a:t>
-            </a:r>
-            <a:r>
-              <a:rPr lang="fr-FR" sz="7200" dirty="0"/>
-              <a:t>": count</a:t>
-            </a:r>
-          </a:p>
-          <a:p>
-            <a:pPr marL="0" indent="0">
-              <a:spcBef>
-                <a:spcPts val="0"/>
-              </a:spcBef>
-              <a:buNone/>
-            </a:pPr>
-            <a:r>
-              <a:rPr lang="fr-FR" sz="7200" dirty="0"/>
-              <a:t>}</a:t>
-            </a:r>
-          </a:p>
-          <a:p>
-            <a:endParaRPr lang="fr-FR" sz="5000" dirty="0"/>
+              <a:rPr lang="fr-FR" sz="1700" dirty="0"/>
+              <a:t>- Sauvegarder dans MongoDB</a:t>
+            </a:r>
           </a:p>
           <a:p>
             <a:pPr marL="0" indent="0">
@@ -5598,10 +6343,10 @@
       </p:sp>
       <p:sp>
         <p:nvSpPr>
-          <p:cNvPr id="7" name="Espace réservé du contenu 6">
+          <p:cNvPr id="4" name="Espace réservé du contenu 3">
             <a:extLst>
               <a:ext uri="{FF2B5EF4-FFF2-40B4-BE49-F238E27FC236}">
-                <a16:creationId xmlns:a16="http://schemas.microsoft.com/office/drawing/2014/main" id="{4DA5FD85-6654-D97A-9D96-508F3024F204}"/>
+                <a16:creationId xmlns:a16="http://schemas.microsoft.com/office/drawing/2014/main" id="{C8054189-6C4B-15F9-CDE6-E4B0E8C8BA50}"/>
               </a:ext>
             </a:extLst>
           </p:cNvPr>
@@ -5614,294 +6359,142 @@
         </p:nvSpPr>
         <p:spPr>
           <a:xfrm>
-            <a:off x="6454793" y="2017342"/>
-            <a:ext cx="4604130" cy="3772701"/>
+            <a:off x="6454793" y="2017343"/>
+            <a:ext cx="4604130" cy="3817400"/>
           </a:xfrm>
         </p:spPr>
         <p:txBody>
           <a:bodyPr>
-            <a:noAutofit/>
+            <a:normAutofit fontScale="92500" lnSpcReduction="10000"/>
           </a:bodyPr>
           <a:lstStyle/>
           <a:p>
             <a:pPr marL="0" indent="0">
-              <a:lnSpc>
-                <a:spcPct val="100000"/>
-              </a:lnSpc>
               <a:spcBef>
-                <a:spcPts val="0"/>
+                <a:spcPts val="1125"/>
               </a:spcBef>
               <a:buNone/>
             </a:pPr>
             <a:r>
-              <a:rPr lang="fr-FR" sz="1800" dirty="0"/>
-              <a:t>logs.streamjob1 {</a:t>
+              <a:rPr lang="fr-FR" b="1" dirty="0">
+                <a:effectLst/>
+              </a:rPr>
+              <a:t>Jobs Streaming</a:t>
             </a:r>
           </a:p>
           <a:p>
             <a:pPr marL="0" indent="0">
-              <a:lnSpc>
-                <a:spcPct val="100000"/>
-              </a:lnSpc>
-              <a:spcBef>
-                <a:spcPts val="0"/>
-              </a:spcBef>
               <a:buNone/>
             </a:pPr>
             <a:r>
-              <a:rPr lang="fr-FR" sz="1800" dirty="0"/>
-              <a:t>    "</a:t>
-            </a:r>
-            <a:r>
-              <a:rPr lang="fr-FR" sz="1800" dirty="0" err="1"/>
-              <a:t>start_time</a:t>
-            </a:r>
-            <a:r>
-              <a:rPr lang="fr-FR" sz="1800" dirty="0"/>
-              <a:t>": timestamp,</a:t>
+              <a:rPr lang="fr-FR" dirty="0">
+                <a:effectLst/>
+                <a:latin typeface="Consolas" panose="020B0609020204030204" pitchFamily="49" charset="0"/>
+              </a:rPr>
+              <a:t>stream_job1.py</a:t>
             </a:r>
           </a:p>
           <a:p>
             <a:pPr marL="0" indent="0">
-              <a:lnSpc>
-                <a:spcPct val="100000"/>
-              </a:lnSpc>
-              <a:spcBef>
-                <a:spcPts val="0"/>
-              </a:spcBef>
               <a:buNone/>
             </a:pPr>
             <a:r>
-              <a:rPr lang="fr-FR" sz="1800" dirty="0"/>
-              <a:t>    "</a:t>
-            </a:r>
-            <a:r>
-              <a:rPr lang="fr-FR" sz="1800" dirty="0" err="1"/>
-              <a:t>end_time</a:t>
-            </a:r>
-            <a:r>
-              <a:rPr lang="fr-FR" sz="1800" dirty="0"/>
-              <a:t>": timestamp,</a:t>
+              <a:rPr lang="fr-FR" sz="1700" dirty="0"/>
+              <a:t>- Surveillance de l'activité IP</a:t>
             </a:r>
           </a:p>
           <a:p>
             <a:pPr marL="0" indent="0">
-              <a:lnSpc>
-                <a:spcPct val="100000"/>
-              </a:lnSpc>
-              <a:spcBef>
-                <a:spcPts val="0"/>
-              </a:spcBef>
               <a:buNone/>
             </a:pPr>
             <a:r>
-              <a:rPr lang="fr-FR" sz="1800" dirty="0"/>
-              <a:t>    "</a:t>
-            </a:r>
-            <a:r>
-              <a:rPr lang="fr-FR" sz="1800" dirty="0" err="1"/>
-              <a:t>ip</a:t>
-            </a:r>
-            <a:r>
-              <a:rPr lang="fr-FR" sz="1800" dirty="0"/>
-              <a:t>": "</a:t>
-            </a:r>
-            <a:r>
-              <a:rPr lang="fr-FR" sz="1800" dirty="0" err="1"/>
-              <a:t>ip_address</a:t>
-            </a:r>
-            <a:r>
-              <a:rPr lang="fr-FR" sz="1800" dirty="0"/>
-              <a:t>",</a:t>
+              <a:rPr lang="fr-FR" sz="1700" dirty="0"/>
+              <a:t>- Fenêtres temporelles de 2 minutes, </a:t>
+            </a:r>
+            <a:r>
+              <a:rPr lang="fr-FR" sz="1700" dirty="0" err="1"/>
+              <a:t>sliding</a:t>
+            </a:r>
+            <a:r>
+              <a:rPr lang="fr-FR" sz="1700" dirty="0"/>
+              <a:t> </a:t>
+            </a:r>
+            <a:r>
+              <a:rPr lang="fr-FR" sz="1700" dirty="0" err="1"/>
+              <a:t>interval</a:t>
+            </a:r>
+            <a:r>
+              <a:rPr lang="fr-FR" sz="1700" dirty="0"/>
+              <a:t> 2 minutes</a:t>
             </a:r>
           </a:p>
           <a:p>
             <a:pPr marL="0" indent="0">
-              <a:lnSpc>
-                <a:spcPct val="100000"/>
-              </a:lnSpc>
-              <a:spcBef>
-                <a:spcPts val="0"/>
-              </a:spcBef>
               <a:buNone/>
             </a:pPr>
             <a:r>
-              <a:rPr lang="fr-FR" sz="1800" dirty="0"/>
-              <a:t>    "count": </a:t>
-            </a:r>
-            <a:r>
-              <a:rPr lang="fr-FR" sz="1800" dirty="0" err="1"/>
-              <a:t>number</a:t>
-            </a:r>
-            <a:endParaRPr lang="fr-FR" sz="1800" dirty="0"/>
+              <a:rPr lang="fr-FR" dirty="0">
+                <a:effectLst/>
+                <a:latin typeface="Consolas" panose="020B0609020204030204" pitchFamily="49" charset="0"/>
+              </a:rPr>
+              <a:t>streamErreur.py</a:t>
+            </a:r>
           </a:p>
           <a:p>
             <a:pPr marL="0" indent="0">
-              <a:lnSpc>
-                <a:spcPct val="100000"/>
-              </a:lnSpc>
-              <a:spcBef>
-                <a:spcPts val="0"/>
-              </a:spcBef>
               <a:buNone/>
             </a:pPr>
             <a:r>
-              <a:rPr lang="fr-FR" sz="1800" dirty="0"/>
-              <a:t>}</a:t>
+              <a:rPr lang="fr-FR" sz="1700" dirty="0"/>
+              <a:t>- Détection des pics d'erreurs (404/500)</a:t>
             </a:r>
           </a:p>
           <a:p>
             <a:pPr marL="0" indent="0">
-              <a:lnSpc>
-                <a:spcPct val="100000"/>
-              </a:lnSpc>
-              <a:spcBef>
-                <a:spcPts val="0"/>
-              </a:spcBef>
               <a:buNone/>
             </a:pPr>
-            <a:endParaRPr lang="fr-FR" sz="1800" dirty="0"/>
+            <a:r>
+              <a:rPr lang="fr-FR" sz="1700" dirty="0"/>
+              <a:t>- Fenêtres temporelles de 2 minutes, </a:t>
+            </a:r>
+            <a:r>
+              <a:rPr lang="fr-FR" sz="1700" dirty="0" err="1"/>
+              <a:t>sliding</a:t>
+            </a:r>
+            <a:r>
+              <a:rPr lang="fr-FR" sz="1700" dirty="0"/>
+              <a:t> </a:t>
+            </a:r>
+            <a:r>
+              <a:rPr lang="fr-FR" sz="1700" dirty="0" err="1"/>
+              <a:t>interval</a:t>
+            </a:r>
+            <a:r>
+              <a:rPr lang="fr-FR" sz="1700" dirty="0"/>
+              <a:t> 2 minutes</a:t>
+            </a:r>
           </a:p>
           <a:p>
             <a:pPr marL="0" indent="0">
-              <a:lnSpc>
-                <a:spcPct val="100000"/>
-              </a:lnSpc>
-              <a:spcBef>
-                <a:spcPts val="0"/>
-              </a:spcBef>
               <a:buNone/>
             </a:pPr>
             <a:r>
-              <a:rPr lang="fr-FR" sz="1800" dirty="0" err="1"/>
-              <a:t>logs.streamErreur</a:t>
-            </a:r>
-            <a:r>
-              <a:rPr lang="fr-FR" sz="1800" dirty="0"/>
-              <a:t> {</a:t>
+              <a:rPr lang="fr-FR" sz="1700" dirty="0"/>
+              <a:t>- Seuils d'alerte</a:t>
             </a:r>
           </a:p>
           <a:p>
             <a:pPr marL="0" indent="0">
-              <a:lnSpc>
-                <a:spcPct val="100000"/>
-              </a:lnSpc>
-              <a:spcBef>
-                <a:spcPts val="0"/>
-              </a:spcBef>
               <a:buNone/>
             </a:pPr>
-            <a:r>
-              <a:rPr lang="fr-FR" sz="1800" dirty="0"/>
-              <a:t>    "</a:t>
-            </a:r>
-            <a:r>
-              <a:rPr lang="fr-FR" sz="1800" dirty="0" err="1"/>
-              <a:t>start_time</a:t>
-            </a:r>
-            <a:r>
-              <a:rPr lang="fr-FR" sz="1800" dirty="0"/>
-              <a:t>": timestamp,</a:t>
-            </a:r>
-          </a:p>
-          <a:p>
-            <a:pPr marL="0" indent="0">
-              <a:lnSpc>
-                <a:spcPct val="100000"/>
-              </a:lnSpc>
-              <a:spcBef>
-                <a:spcPts val="0"/>
-              </a:spcBef>
-              <a:buNone/>
-            </a:pPr>
-            <a:r>
-              <a:rPr lang="fr-FR" sz="1800" dirty="0"/>
-              <a:t>    "</a:t>
-            </a:r>
-            <a:r>
-              <a:rPr lang="fr-FR" sz="1800" dirty="0" err="1"/>
-              <a:t>end_time</a:t>
-            </a:r>
-            <a:r>
-              <a:rPr lang="fr-FR" sz="1800" dirty="0"/>
-              <a:t>": timestamp,</a:t>
-            </a:r>
-          </a:p>
-          <a:p>
-            <a:pPr marL="0" indent="0">
-              <a:lnSpc>
-                <a:spcPct val="100000"/>
-              </a:lnSpc>
-              <a:spcBef>
-                <a:spcPts val="0"/>
-              </a:spcBef>
-              <a:buNone/>
-            </a:pPr>
-            <a:r>
-              <a:rPr lang="fr-FR" sz="1800" dirty="0"/>
-              <a:t>    "</a:t>
-            </a:r>
-            <a:r>
-              <a:rPr lang="fr-FR" sz="1800" dirty="0" err="1"/>
-              <a:t>status</a:t>
-            </a:r>
-            <a:r>
-              <a:rPr lang="fr-FR" sz="1800" dirty="0"/>
-              <a:t>": </a:t>
-            </a:r>
-            <a:r>
-              <a:rPr lang="fr-FR" sz="1800" dirty="0" err="1"/>
-              <a:t>number</a:t>
-            </a:r>
-            <a:r>
-              <a:rPr lang="fr-FR" sz="1800" dirty="0"/>
-              <a:t>,</a:t>
-            </a:r>
-          </a:p>
-          <a:p>
-            <a:pPr marL="0" indent="0">
-              <a:lnSpc>
-                <a:spcPct val="100000"/>
-              </a:lnSpc>
-              <a:spcBef>
-                <a:spcPts val="0"/>
-              </a:spcBef>
-              <a:buNone/>
-            </a:pPr>
-            <a:r>
-              <a:rPr lang="fr-FR" sz="1800" dirty="0"/>
-              <a:t>    "count": </a:t>
-            </a:r>
-            <a:r>
-              <a:rPr lang="fr-FR" sz="1800" dirty="0" err="1"/>
-              <a:t>number</a:t>
-            </a:r>
-            <a:endParaRPr lang="fr-FR" sz="1800" dirty="0"/>
-          </a:p>
-          <a:p>
-            <a:pPr marL="0" indent="0">
-              <a:lnSpc>
-                <a:spcPct val="100000"/>
-              </a:lnSpc>
-              <a:spcBef>
-                <a:spcPts val="0"/>
-              </a:spcBef>
-              <a:buNone/>
-            </a:pPr>
-            <a:r>
-              <a:rPr lang="fr-FR" sz="1800" dirty="0"/>
-              <a:t>}</a:t>
-            </a:r>
-          </a:p>
-          <a:p>
-            <a:endParaRPr lang="fr-FR" sz="1800" dirty="0"/>
+            <a:endParaRPr lang="fr-FR" dirty="0"/>
           </a:p>
         </p:txBody>
       </p:sp>
     </p:spTree>
     <p:extLst>
       <p:ext uri="{BB962C8B-B14F-4D97-AF65-F5344CB8AC3E}">
-        <p14:creationId xmlns:p14="http://schemas.microsoft.com/office/powerpoint/2010/main" val="2633986565"/>
+        <p14:creationId xmlns:p14="http://schemas.microsoft.com/office/powerpoint/2010/main" val="2761359753"/>
       </p:ext>
     </p:extLst>
   </p:cSld>
@@ -5933,7 +6526,7 @@
           <p:cNvPr id="2" name="Titre 1">
             <a:extLst>
               <a:ext uri="{FF2B5EF4-FFF2-40B4-BE49-F238E27FC236}">
-                <a16:creationId xmlns:a16="http://schemas.microsoft.com/office/drawing/2014/main" id="{CD7C15AB-BC9C-10E3-B298-B139E72A06E5}"/>
+                <a16:creationId xmlns:a16="http://schemas.microsoft.com/office/drawing/2014/main" id="{A4587044-671D-9466-CC9B-E8159756AE4D}"/>
               </a:ext>
             </a:extLst>
           </p:cNvPr>
@@ -5946,20 +6539,558 @@
         </p:nvSpPr>
         <p:spPr/>
         <p:txBody>
-          <a:bodyPr/>
+          <a:bodyPr anchor="t"/>
           <a:lstStyle/>
           <a:p>
             <a:r>
               <a:rPr lang="fr-FR" dirty="0"/>
-              <a:t>Live démo</a:t>
-            </a:r>
+              <a:t>Structure MongoDB</a:t>
+            </a:r>
+          </a:p>
+        </p:txBody>
+      </p:sp>
+      <p:sp>
+        <p:nvSpPr>
+          <p:cNvPr id="6" name="Espace réservé du contenu 5">
+            <a:extLst>
+              <a:ext uri="{FF2B5EF4-FFF2-40B4-BE49-F238E27FC236}">
+                <a16:creationId xmlns:a16="http://schemas.microsoft.com/office/drawing/2014/main" id="{866F2135-C47F-DB5C-3F57-5ACA0CE2E9A2}"/>
+              </a:ext>
+            </a:extLst>
+          </p:cNvPr>
+          <p:cNvSpPr>
+            <a:spLocks noGrp="1"/>
+          </p:cNvSpPr>
+          <p:nvPr>
+            <p:ph sz="half" idx="1"/>
+          </p:nvPr>
+        </p:nvSpPr>
+        <p:spPr>
+          <a:xfrm>
+            <a:off x="1534695" y="2010878"/>
+            <a:ext cx="4608576" cy="3772702"/>
+          </a:xfrm>
+        </p:spPr>
+        <p:txBody>
+          <a:bodyPr>
+            <a:normAutofit fontScale="25000" lnSpcReduction="20000"/>
+          </a:bodyPr>
+          <a:lstStyle/>
+          <a:p>
+            <a:pPr marL="0" indent="0">
+              <a:spcBef>
+                <a:spcPts val="0"/>
+              </a:spcBef>
+              <a:buNone/>
+            </a:pPr>
+            <a:r>
+              <a:rPr lang="fr-FR" sz="7200" dirty="0"/>
+              <a:t>logs.products_count {</a:t>
+            </a:r>
+          </a:p>
+          <a:p>
+            <a:pPr marL="0" indent="0">
+              <a:spcBef>
+                <a:spcPts val="0"/>
+              </a:spcBef>
+              <a:buNone/>
+            </a:pPr>
+            <a:r>
+              <a:rPr lang="fr-FR" sz="7200" dirty="0"/>
+              <a:t>    "Name": "</a:t>
+            </a:r>
+            <a:r>
+              <a:rPr lang="fr-FR" sz="7200" dirty="0" err="1"/>
+              <a:t>product_name</a:t>
+            </a:r>
+            <a:r>
+              <a:rPr lang="fr-FR" sz="7200" dirty="0"/>
+              <a:t>",</a:t>
+            </a:r>
+          </a:p>
+          <a:p>
+            <a:pPr marL="0" indent="0">
+              <a:spcBef>
+                <a:spcPts val="0"/>
+              </a:spcBef>
+              <a:buNone/>
+            </a:pPr>
+            <a:r>
+              <a:rPr lang="fr-FR" sz="7200" dirty="0"/>
+              <a:t>    "ID": "</a:t>
+            </a:r>
+            <a:r>
+              <a:rPr lang="fr-FR" sz="7200" dirty="0" err="1"/>
+              <a:t>product_id</a:t>
+            </a:r>
+            <a:r>
+              <a:rPr lang="fr-FR" sz="7200" dirty="0"/>
+              <a:t>",</a:t>
+            </a:r>
+          </a:p>
+          <a:p>
+            <a:pPr marL="0" indent="0">
+              <a:spcBef>
+                <a:spcPts val="0"/>
+              </a:spcBef>
+              <a:buNone/>
+            </a:pPr>
+            <a:r>
+              <a:rPr lang="fr-FR" sz="7200" dirty="0"/>
+              <a:t>    "count": </a:t>
+            </a:r>
+            <a:r>
+              <a:rPr lang="fr-FR" sz="7200" dirty="0" err="1"/>
+              <a:t>number</a:t>
+            </a:r>
+            <a:endParaRPr lang="fr-FR" sz="7200" dirty="0"/>
+          </a:p>
+          <a:p>
+            <a:pPr marL="0" indent="0">
+              <a:spcBef>
+                <a:spcPts val="0"/>
+              </a:spcBef>
+              <a:buNone/>
+            </a:pPr>
+            <a:r>
+              <a:rPr lang="fr-FR" sz="7200" dirty="0"/>
+              <a:t>}</a:t>
+            </a:r>
+          </a:p>
+          <a:p>
+            <a:pPr marL="0" indent="0">
+              <a:spcBef>
+                <a:spcPts val="0"/>
+              </a:spcBef>
+              <a:buNone/>
+            </a:pPr>
+            <a:endParaRPr lang="fr-FR" sz="7200" dirty="0"/>
+          </a:p>
+          <a:p>
+            <a:pPr marL="0" indent="0">
+              <a:spcBef>
+                <a:spcPts val="0"/>
+              </a:spcBef>
+              <a:buNone/>
+            </a:pPr>
+            <a:r>
+              <a:rPr lang="fr-FR" sz="7200" dirty="0" err="1"/>
+              <a:t>logs.status_count</a:t>
+            </a:r>
+            <a:r>
+              <a:rPr lang="fr-FR" sz="7200" dirty="0"/>
+              <a:t> {</a:t>
+            </a:r>
+          </a:p>
+          <a:p>
+            <a:pPr marL="0" indent="0">
+              <a:spcBef>
+                <a:spcPts val="0"/>
+              </a:spcBef>
+              <a:buNone/>
+            </a:pPr>
+            <a:r>
+              <a:rPr lang="fr-FR" sz="7200" dirty="0"/>
+              <a:t>    "</a:t>
+            </a:r>
+            <a:r>
+              <a:rPr lang="fr-FR" sz="7200" dirty="0" err="1"/>
+              <a:t>window</a:t>
+            </a:r>
+            <a:r>
+              <a:rPr lang="fr-FR" sz="7200" dirty="0"/>
+              <a:t>": {</a:t>
+            </a:r>
+          </a:p>
+          <a:p>
+            <a:pPr marL="0" indent="0">
+              <a:spcBef>
+                <a:spcPts val="0"/>
+              </a:spcBef>
+              <a:buNone/>
+            </a:pPr>
+            <a:r>
+              <a:rPr lang="fr-FR" sz="7200" dirty="0"/>
+              <a:t>        "start": timestamp,</a:t>
+            </a:r>
+          </a:p>
+          <a:p>
+            <a:pPr marL="0" indent="0">
+              <a:spcBef>
+                <a:spcPts val="0"/>
+              </a:spcBef>
+              <a:buNone/>
+            </a:pPr>
+            <a:r>
+              <a:rPr lang="fr-FR" sz="7200" dirty="0"/>
+              <a:t>        "end": timestamp</a:t>
+            </a:r>
+          </a:p>
+          <a:p>
+            <a:pPr marL="0" indent="0">
+              <a:spcBef>
+                <a:spcPts val="0"/>
+              </a:spcBef>
+              <a:buNone/>
+            </a:pPr>
+            <a:r>
+              <a:rPr lang="fr-FR" sz="7200" dirty="0"/>
+              <a:t>    },</a:t>
+            </a:r>
+          </a:p>
+          <a:p>
+            <a:pPr marL="0" indent="0">
+              <a:spcBef>
+                <a:spcPts val="0"/>
+              </a:spcBef>
+              <a:buNone/>
+            </a:pPr>
+            <a:r>
+              <a:rPr lang="fr-FR" sz="7200" dirty="0"/>
+              <a:t>    "</a:t>
+            </a:r>
+            <a:r>
+              <a:rPr lang="fr-FR" sz="7200" dirty="0" err="1"/>
+              <a:t>status_code</a:t>
+            </a:r>
+            <a:r>
+              <a:rPr lang="fr-FR" sz="7200" dirty="0"/>
+              <a:t>": count</a:t>
+            </a:r>
+          </a:p>
+          <a:p>
+            <a:pPr marL="0" indent="0">
+              <a:spcBef>
+                <a:spcPts val="0"/>
+              </a:spcBef>
+              <a:buNone/>
+            </a:pPr>
+            <a:r>
+              <a:rPr lang="fr-FR" sz="7200" dirty="0"/>
+              <a:t>}</a:t>
+            </a:r>
+          </a:p>
+          <a:p>
+            <a:endParaRPr lang="fr-FR" sz="5000" dirty="0"/>
+          </a:p>
+          <a:p>
+            <a:pPr marL="0" indent="0">
+              <a:buNone/>
+            </a:pPr>
+            <a:endParaRPr lang="fr-FR" dirty="0"/>
+          </a:p>
+        </p:txBody>
+      </p:sp>
+      <p:sp>
+        <p:nvSpPr>
+          <p:cNvPr id="7" name="Espace réservé du contenu 6">
+            <a:extLst>
+              <a:ext uri="{FF2B5EF4-FFF2-40B4-BE49-F238E27FC236}">
+                <a16:creationId xmlns:a16="http://schemas.microsoft.com/office/drawing/2014/main" id="{4DA5FD85-6654-D97A-9D96-508F3024F204}"/>
+              </a:ext>
+            </a:extLst>
+          </p:cNvPr>
+          <p:cNvSpPr>
+            <a:spLocks noGrp="1"/>
+          </p:cNvSpPr>
+          <p:nvPr>
+            <p:ph sz="half" idx="2"/>
+          </p:nvPr>
+        </p:nvSpPr>
+        <p:spPr>
+          <a:xfrm>
+            <a:off x="6454793" y="2017342"/>
+            <a:ext cx="4604130" cy="3772701"/>
+          </a:xfrm>
+        </p:spPr>
+        <p:txBody>
+          <a:bodyPr>
+            <a:noAutofit/>
+          </a:bodyPr>
+          <a:lstStyle/>
+          <a:p>
+            <a:pPr marL="0" indent="0">
+              <a:lnSpc>
+                <a:spcPct val="100000"/>
+              </a:lnSpc>
+              <a:spcBef>
+                <a:spcPts val="0"/>
+              </a:spcBef>
+              <a:buNone/>
+            </a:pPr>
+            <a:r>
+              <a:rPr lang="fr-FR" sz="1800" dirty="0" err="1"/>
+              <a:t>logs.IpWatch</a:t>
+            </a:r>
+            <a:r>
+              <a:rPr lang="fr-FR" sz="1800" dirty="0"/>
+              <a:t> {</a:t>
+            </a:r>
+          </a:p>
+          <a:p>
+            <a:pPr marL="0" indent="0">
+              <a:lnSpc>
+                <a:spcPct val="100000"/>
+              </a:lnSpc>
+              <a:spcBef>
+                <a:spcPts val="0"/>
+              </a:spcBef>
+              <a:buNone/>
+            </a:pPr>
+            <a:r>
+              <a:rPr lang="fr-FR" sz="1800" dirty="0"/>
+              <a:t>    "</a:t>
+            </a:r>
+            <a:r>
+              <a:rPr lang="fr-FR" sz="1800" dirty="0" err="1"/>
+              <a:t>start_time</a:t>
+            </a:r>
+            <a:r>
+              <a:rPr lang="fr-FR" sz="1800" dirty="0"/>
+              <a:t>": timestamp,</a:t>
+            </a:r>
+          </a:p>
+          <a:p>
+            <a:pPr marL="0" indent="0">
+              <a:lnSpc>
+                <a:spcPct val="100000"/>
+              </a:lnSpc>
+              <a:spcBef>
+                <a:spcPts val="0"/>
+              </a:spcBef>
+              <a:buNone/>
+            </a:pPr>
+            <a:r>
+              <a:rPr lang="fr-FR" sz="1800" dirty="0"/>
+              <a:t>    "</a:t>
+            </a:r>
+            <a:r>
+              <a:rPr lang="fr-FR" sz="1800" dirty="0" err="1"/>
+              <a:t>end_time</a:t>
+            </a:r>
+            <a:r>
+              <a:rPr lang="fr-FR" sz="1800" dirty="0"/>
+              <a:t>": timestamp,</a:t>
+            </a:r>
+          </a:p>
+          <a:p>
+            <a:pPr marL="0" indent="0">
+              <a:lnSpc>
+                <a:spcPct val="100000"/>
+              </a:lnSpc>
+              <a:spcBef>
+                <a:spcPts val="0"/>
+              </a:spcBef>
+              <a:buNone/>
+            </a:pPr>
+            <a:r>
+              <a:rPr lang="fr-FR" sz="1800" dirty="0"/>
+              <a:t>    "</a:t>
+            </a:r>
+            <a:r>
+              <a:rPr lang="fr-FR" sz="1800" dirty="0" err="1"/>
+              <a:t>ip</a:t>
+            </a:r>
+            <a:r>
+              <a:rPr lang="fr-FR" sz="1800" dirty="0"/>
+              <a:t>": "</a:t>
+            </a:r>
+            <a:r>
+              <a:rPr lang="fr-FR" sz="1800" dirty="0" err="1"/>
+              <a:t>ip_address</a:t>
+            </a:r>
+            <a:r>
+              <a:rPr lang="fr-FR" sz="1800" dirty="0"/>
+              <a:t>",</a:t>
+            </a:r>
+          </a:p>
+          <a:p>
+            <a:pPr marL="0" indent="0">
+              <a:lnSpc>
+                <a:spcPct val="100000"/>
+              </a:lnSpc>
+              <a:spcBef>
+                <a:spcPts val="0"/>
+              </a:spcBef>
+              <a:buNone/>
+            </a:pPr>
+            <a:r>
+              <a:rPr lang="fr-FR" sz="1800" dirty="0"/>
+              <a:t>    "count": </a:t>
+            </a:r>
+            <a:r>
+              <a:rPr lang="fr-FR" sz="1800" dirty="0" err="1"/>
+              <a:t>number</a:t>
+            </a:r>
+            <a:endParaRPr lang="fr-FR" sz="1800" dirty="0"/>
+          </a:p>
+          <a:p>
+            <a:pPr marL="0" indent="0">
+              <a:lnSpc>
+                <a:spcPct val="100000"/>
+              </a:lnSpc>
+              <a:spcBef>
+                <a:spcPts val="0"/>
+              </a:spcBef>
+              <a:buNone/>
+            </a:pPr>
+            <a:r>
+              <a:rPr lang="fr-FR" sz="1800" dirty="0"/>
+              <a:t>}</a:t>
+            </a:r>
+          </a:p>
+          <a:p>
+            <a:pPr marL="0" indent="0">
+              <a:lnSpc>
+                <a:spcPct val="100000"/>
+              </a:lnSpc>
+              <a:spcBef>
+                <a:spcPts val="0"/>
+              </a:spcBef>
+              <a:buNone/>
+            </a:pPr>
+            <a:endParaRPr lang="fr-FR" sz="1800" dirty="0"/>
+          </a:p>
+          <a:p>
+            <a:pPr marL="0" indent="0">
+              <a:lnSpc>
+                <a:spcPct val="100000"/>
+              </a:lnSpc>
+              <a:spcBef>
+                <a:spcPts val="0"/>
+              </a:spcBef>
+              <a:buNone/>
+            </a:pPr>
+            <a:r>
+              <a:rPr lang="fr-FR" sz="1800" dirty="0" err="1"/>
+              <a:t>logs.streamErreur</a:t>
+            </a:r>
+            <a:r>
+              <a:rPr lang="fr-FR" sz="1800" dirty="0"/>
+              <a:t> {</a:t>
+            </a:r>
+          </a:p>
+          <a:p>
+            <a:pPr marL="0" indent="0">
+              <a:lnSpc>
+                <a:spcPct val="100000"/>
+              </a:lnSpc>
+              <a:spcBef>
+                <a:spcPts val="0"/>
+              </a:spcBef>
+              <a:buNone/>
+            </a:pPr>
+            <a:r>
+              <a:rPr lang="fr-FR" sz="1800" dirty="0"/>
+              <a:t>    "</a:t>
+            </a:r>
+            <a:r>
+              <a:rPr lang="fr-FR" sz="1800" dirty="0" err="1"/>
+              <a:t>start_time</a:t>
+            </a:r>
+            <a:r>
+              <a:rPr lang="fr-FR" sz="1800" dirty="0"/>
+              <a:t>": timestamp,</a:t>
+            </a:r>
+          </a:p>
+          <a:p>
+            <a:pPr marL="0" indent="0">
+              <a:lnSpc>
+                <a:spcPct val="100000"/>
+              </a:lnSpc>
+              <a:spcBef>
+                <a:spcPts val="0"/>
+              </a:spcBef>
+              <a:buNone/>
+            </a:pPr>
+            <a:r>
+              <a:rPr lang="fr-FR" sz="1800" dirty="0"/>
+              <a:t>    "</a:t>
+            </a:r>
+            <a:r>
+              <a:rPr lang="fr-FR" sz="1800" dirty="0" err="1"/>
+              <a:t>end_time</a:t>
+            </a:r>
+            <a:r>
+              <a:rPr lang="fr-FR" sz="1800" dirty="0"/>
+              <a:t>": timestamp,</a:t>
+            </a:r>
+          </a:p>
+          <a:p>
+            <a:pPr marL="0" indent="0">
+              <a:lnSpc>
+                <a:spcPct val="100000"/>
+              </a:lnSpc>
+              <a:spcBef>
+                <a:spcPts val="0"/>
+              </a:spcBef>
+              <a:buNone/>
+            </a:pPr>
+            <a:r>
+              <a:rPr lang="fr-FR" sz="1800" dirty="0"/>
+              <a:t>    "</a:t>
+            </a:r>
+            <a:r>
+              <a:rPr lang="fr-FR" sz="1800" dirty="0" err="1"/>
+              <a:t>status</a:t>
+            </a:r>
+            <a:r>
+              <a:rPr lang="fr-FR" sz="1800" dirty="0"/>
+              <a:t>": </a:t>
+            </a:r>
+            <a:r>
+              <a:rPr lang="fr-FR" sz="1800" dirty="0" err="1"/>
+              <a:t>number</a:t>
+            </a:r>
+            <a:r>
+              <a:rPr lang="fr-FR" sz="1800" dirty="0"/>
+              <a:t>,</a:t>
+            </a:r>
+          </a:p>
+          <a:p>
+            <a:pPr marL="0" indent="0">
+              <a:lnSpc>
+                <a:spcPct val="100000"/>
+              </a:lnSpc>
+              <a:spcBef>
+                <a:spcPts val="0"/>
+              </a:spcBef>
+              <a:buNone/>
+            </a:pPr>
+            <a:r>
+              <a:rPr lang="fr-FR" sz="1800" dirty="0"/>
+              <a:t>    "count": </a:t>
+            </a:r>
+            <a:r>
+              <a:rPr lang="fr-FR" sz="1800" dirty="0" err="1"/>
+              <a:t>number</a:t>
+            </a:r>
+            <a:endParaRPr lang="fr-FR" sz="1800" dirty="0"/>
+          </a:p>
+          <a:p>
+            <a:pPr marL="0" indent="0">
+              <a:lnSpc>
+                <a:spcPct val="100000"/>
+              </a:lnSpc>
+              <a:spcBef>
+                <a:spcPts val="0"/>
+              </a:spcBef>
+              <a:buNone/>
+            </a:pPr>
+            <a:r>
+              <a:rPr lang="fr-FR" sz="1800" dirty="0"/>
+              <a:t>}</a:t>
+            </a:r>
+          </a:p>
+          <a:p>
+            <a:endParaRPr lang="fr-FR" sz="1800" dirty="0"/>
           </a:p>
         </p:txBody>
       </p:sp>
     </p:spTree>
     <p:extLst>
       <p:ext uri="{BB962C8B-B14F-4D97-AF65-F5344CB8AC3E}">
-        <p14:creationId xmlns:p14="http://schemas.microsoft.com/office/powerpoint/2010/main" val="1693291144"/>
+        <p14:creationId xmlns:p14="http://schemas.microsoft.com/office/powerpoint/2010/main" val="2633986565"/>
       </p:ext>
     </p:extLst>
   </p:cSld>
@@ -5991,6 +7122,172 @@
           <p:cNvPr id="2" name="Titre 1">
             <a:extLst>
               <a:ext uri="{FF2B5EF4-FFF2-40B4-BE49-F238E27FC236}">
+                <a16:creationId xmlns:a16="http://schemas.microsoft.com/office/drawing/2014/main" id="{ED51F72F-3D07-FFC0-C849-40BCF9B4CD1E}"/>
+              </a:ext>
+            </a:extLst>
+          </p:cNvPr>
+          <p:cNvSpPr>
+            <a:spLocks noGrp="1"/>
+          </p:cNvSpPr>
+          <p:nvPr>
+            <p:ph type="title"/>
+          </p:nvPr>
+        </p:nvSpPr>
+        <p:spPr/>
+        <p:txBody>
+          <a:bodyPr anchor="t"/>
+          <a:lstStyle/>
+          <a:p>
+            <a:r>
+              <a:rPr lang="fr-FR" dirty="0"/>
+              <a:t>Résultats obtenus</a:t>
+            </a:r>
+          </a:p>
+        </p:txBody>
+      </p:sp>
+      <p:sp>
+        <p:nvSpPr>
+          <p:cNvPr id="3" name="Espace réservé du contenu 2">
+            <a:extLst>
+              <a:ext uri="{FF2B5EF4-FFF2-40B4-BE49-F238E27FC236}">
+                <a16:creationId xmlns:a16="http://schemas.microsoft.com/office/drawing/2014/main" id="{9233D7CF-9A0B-36E8-F802-E44AFB74D2F1}"/>
+              </a:ext>
+            </a:extLst>
+          </p:cNvPr>
+          <p:cNvSpPr>
+            <a:spLocks noGrp="1"/>
+          </p:cNvSpPr>
+          <p:nvPr>
+            <p:ph sz="half" idx="1"/>
+          </p:nvPr>
+        </p:nvSpPr>
+        <p:spPr/>
+        <p:txBody>
+          <a:bodyPr/>
+          <a:lstStyle/>
+          <a:p>
+            <a:endParaRPr lang="fr-FR"/>
+          </a:p>
+        </p:txBody>
+      </p:sp>
+      <p:sp>
+        <p:nvSpPr>
+          <p:cNvPr id="4" name="Espace réservé du contenu 3">
+            <a:extLst>
+              <a:ext uri="{FF2B5EF4-FFF2-40B4-BE49-F238E27FC236}">
+                <a16:creationId xmlns:a16="http://schemas.microsoft.com/office/drawing/2014/main" id="{33A86498-0E2F-FED6-00ED-0D505C3DD067}"/>
+              </a:ext>
+            </a:extLst>
+          </p:cNvPr>
+          <p:cNvSpPr>
+            <a:spLocks noGrp="1"/>
+          </p:cNvSpPr>
+          <p:nvPr>
+            <p:ph sz="half" idx="2"/>
+          </p:nvPr>
+        </p:nvSpPr>
+        <p:spPr/>
+        <p:txBody>
+          <a:bodyPr/>
+          <a:lstStyle/>
+          <a:p>
+            <a:endParaRPr lang="fr-FR"/>
+          </a:p>
+        </p:txBody>
+      </p:sp>
+    </p:spTree>
+    <p:extLst>
+      <p:ext uri="{BB962C8B-B14F-4D97-AF65-F5344CB8AC3E}">
+        <p14:creationId xmlns:p14="http://schemas.microsoft.com/office/powerpoint/2010/main" val="3287370568"/>
+      </p:ext>
+    </p:extLst>
+  </p:cSld>
+  <p:clrMapOvr>
+    <a:masterClrMapping/>
+  </p:clrMapOvr>
+</p:sld>
+</file>
+
+<file path=ppt/slides/slide7.xml><?xml version="1.0" encoding="utf-8"?>
+<p:sld xmlns:a="http://schemas.openxmlformats.org/drawingml/2006/main" xmlns:r="http://schemas.openxmlformats.org/officeDocument/2006/relationships" xmlns:p="http://schemas.openxmlformats.org/presentationml/2006/main">
+  <p:cSld>
+    <p:spTree>
+      <p:nvGrpSpPr>
+        <p:cNvPr id="1" name=""/>
+        <p:cNvGrpSpPr/>
+        <p:nvPr/>
+      </p:nvGrpSpPr>
+      <p:grpSpPr>
+        <a:xfrm>
+          <a:off x="0" y="0"/>
+          <a:ext cx="0" cy="0"/>
+          <a:chOff x="0" y="0"/>
+          <a:chExt cx="0" cy="0"/>
+        </a:xfrm>
+      </p:grpSpPr>
+      <p:sp>
+        <p:nvSpPr>
+          <p:cNvPr id="2" name="Titre 1">
+            <a:extLst>
+              <a:ext uri="{FF2B5EF4-FFF2-40B4-BE49-F238E27FC236}">
+                <a16:creationId xmlns:a16="http://schemas.microsoft.com/office/drawing/2014/main" id="{CD7C15AB-BC9C-10E3-B298-B139E72A06E5}"/>
+              </a:ext>
+            </a:extLst>
+          </p:cNvPr>
+          <p:cNvSpPr>
+            <a:spLocks noGrp="1"/>
+          </p:cNvSpPr>
+          <p:nvPr>
+            <p:ph type="title"/>
+          </p:nvPr>
+        </p:nvSpPr>
+        <p:spPr/>
+        <p:txBody>
+          <a:bodyPr/>
+          <a:lstStyle/>
+          <a:p>
+            <a:r>
+              <a:rPr lang="fr-FR" dirty="0"/>
+              <a:t>Live démo ?</a:t>
+            </a:r>
+          </a:p>
+        </p:txBody>
+      </p:sp>
+    </p:spTree>
+    <p:extLst>
+      <p:ext uri="{BB962C8B-B14F-4D97-AF65-F5344CB8AC3E}">
+        <p14:creationId xmlns:p14="http://schemas.microsoft.com/office/powerpoint/2010/main" val="1693291144"/>
+      </p:ext>
+    </p:extLst>
+  </p:cSld>
+  <p:clrMapOvr>
+    <a:masterClrMapping/>
+  </p:clrMapOvr>
+</p:sld>
+</file>
+
+<file path=ppt/slides/slide8.xml><?xml version="1.0" encoding="utf-8"?>
+<p:sld xmlns:a="http://schemas.openxmlformats.org/drawingml/2006/main" xmlns:r="http://schemas.openxmlformats.org/officeDocument/2006/relationships" xmlns:p="http://schemas.openxmlformats.org/presentationml/2006/main">
+  <p:cSld>
+    <p:spTree>
+      <p:nvGrpSpPr>
+        <p:cNvPr id="1" name=""/>
+        <p:cNvGrpSpPr/>
+        <p:nvPr/>
+      </p:nvGrpSpPr>
+      <p:grpSpPr>
+        <a:xfrm>
+          <a:off x="0" y="0"/>
+          <a:ext cx="0" cy="0"/>
+          <a:chOff x="0" y="0"/>
+          <a:chExt cx="0" cy="0"/>
+        </a:xfrm>
+      </p:grpSpPr>
+      <p:sp>
+        <p:nvSpPr>
+          <p:cNvPr id="2" name="Titre 1">
+            <a:extLst>
+              <a:ext uri="{FF2B5EF4-FFF2-40B4-BE49-F238E27FC236}">
                 <a16:creationId xmlns:a16="http://schemas.microsoft.com/office/drawing/2014/main" id="{00A94353-C7F0-48CC-60EC-AE494F40AB53}"/>
               </a:ext>
             </a:extLst>
@@ -6009,33 +7306,8 @@
           <a:p>
             <a:r>
               <a:rPr lang="fr-FR" dirty="0"/>
-              <a:t>Conclusion</a:t>
-            </a:r>
-          </a:p>
-        </p:txBody>
-      </p:sp>
-      <p:sp>
-        <p:nvSpPr>
-          <p:cNvPr id="3" name="Sous-titre 2">
-            <a:extLst>
-              <a:ext uri="{FF2B5EF4-FFF2-40B4-BE49-F238E27FC236}">
-                <a16:creationId xmlns:a16="http://schemas.microsoft.com/office/drawing/2014/main" id="{813AC301-E2D0-8C99-2525-47604D1ED5F7}"/>
-              </a:ext>
-            </a:extLst>
-          </p:cNvPr>
-          <p:cNvSpPr>
-            <a:spLocks noGrp="1"/>
-          </p:cNvSpPr>
-          <p:nvPr>
-            <p:ph type="subTitle" idx="1"/>
-          </p:nvPr>
-        </p:nvSpPr>
-        <p:spPr/>
-        <p:txBody>
-          <a:bodyPr/>
-          <a:lstStyle/>
-          <a:p>
-            <a:endParaRPr lang="fr-FR"/>
+              <a:t>Questions ?</a:t>
+            </a:r>
           </a:p>
         </p:txBody>
       </p:sp>

</xml_diff>

<commit_message>
add pictures results in presentation
</commit_message>
<xml_diff>
--- a/presentation_projet_clement_lore.pptx
+++ b/presentation_projet_clement_lore.pptx
@@ -7145,56 +7145,64 @@
           </a:p>
         </p:txBody>
       </p:sp>
-      <p:sp>
-        <p:nvSpPr>
-          <p:cNvPr id="3" name="Espace réservé du contenu 2">
+      <p:pic>
+        <p:nvPicPr>
+          <p:cNvPr id="6" name="Espace réservé du contenu 5">
             <a:extLst>
               <a:ext uri="{FF2B5EF4-FFF2-40B4-BE49-F238E27FC236}">
-                <a16:creationId xmlns:a16="http://schemas.microsoft.com/office/drawing/2014/main" id="{9233D7CF-9A0B-36E8-F802-E44AFB74D2F1}"/>
+                <a16:creationId xmlns:a16="http://schemas.microsoft.com/office/drawing/2014/main" id="{FCE56023-8527-15E4-0761-DBA8B6EE1BDD}"/>
               </a:ext>
             </a:extLst>
           </p:cNvPr>
-          <p:cNvSpPr>
-            <a:spLocks noGrp="1"/>
-          </p:cNvSpPr>
+          <p:cNvPicPr>
+            <a:picLocks noGrp="1" noChangeAspect="1"/>
+          </p:cNvPicPr>
           <p:nvPr>
             <p:ph sz="half" idx="1"/>
           </p:nvPr>
-        </p:nvSpPr>
-        <p:spPr/>
-        <p:txBody>
-          <a:bodyPr/>
-          <a:lstStyle/>
-          <a:p>
-            <a:endParaRPr lang="fr-FR"/>
-          </a:p>
-        </p:txBody>
-      </p:sp>
-      <p:sp>
-        <p:nvSpPr>
-          <p:cNvPr id="4" name="Espace réservé du contenu 3">
+        </p:nvPicPr>
+        <p:blipFill>
+          <a:blip r:embed="rId2"/>
+          <a:stretch>
+            <a:fillRect/>
+          </a:stretch>
+        </p:blipFill>
+        <p:spPr>
+          <a:xfrm>
+            <a:off x="1924333" y="1811915"/>
+            <a:ext cx="3147407" cy="4073115"/>
+          </a:xfrm>
+        </p:spPr>
+      </p:pic>
+      <p:pic>
+        <p:nvPicPr>
+          <p:cNvPr id="8" name="Espace réservé du contenu 7">
             <a:extLst>
               <a:ext uri="{FF2B5EF4-FFF2-40B4-BE49-F238E27FC236}">
-                <a16:creationId xmlns:a16="http://schemas.microsoft.com/office/drawing/2014/main" id="{33A86498-0E2F-FED6-00ED-0D505C3DD067}"/>
+                <a16:creationId xmlns:a16="http://schemas.microsoft.com/office/drawing/2014/main" id="{F6DD4172-8273-9892-40F7-62753AA796B0}"/>
               </a:ext>
             </a:extLst>
           </p:cNvPr>
-          <p:cNvSpPr>
-            <a:spLocks noGrp="1"/>
-          </p:cNvSpPr>
+          <p:cNvPicPr>
+            <a:picLocks noGrp="1" noChangeAspect="1"/>
+          </p:cNvPicPr>
           <p:nvPr>
             <p:ph sz="half" idx="2"/>
           </p:nvPr>
-        </p:nvSpPr>
-        <p:spPr/>
-        <p:txBody>
-          <a:bodyPr/>
-          <a:lstStyle/>
-          <a:p>
-            <a:endParaRPr lang="fr-FR"/>
-          </a:p>
-        </p:txBody>
-      </p:sp>
+        </p:nvPicPr>
+        <p:blipFill>
+          <a:blip r:embed="rId3"/>
+          <a:stretch>
+            <a:fillRect/>
+          </a:stretch>
+        </p:blipFill>
+        <p:spPr>
+          <a:xfrm>
+            <a:off x="6918689" y="1811915"/>
+            <a:ext cx="3207882" cy="4029637"/>
+          </a:xfrm>
+        </p:spPr>
+      </p:pic>
     </p:spTree>
     <p:extLst>
       <p:ext uri="{BB962C8B-B14F-4D97-AF65-F5344CB8AC3E}">

</xml_diff>

<commit_message>
changes and add results picture presentation
</commit_message>
<xml_diff>
--- a/presentation_projet_clement_lore.pptx
+++ b/presentation_projet_clement_lore.pptx
@@ -659,18 +659,9 @@
               <a:buChar char="-"/>
             </a:pPr>
             <a:r>
-              <a:rPr lang="fr-FR" dirty="0" err="1"/>
-              <a:t>MongoDBData</a:t>
-            </a:r>
-            <a:r>
               <a:rPr lang="fr-FR" dirty="0"/>
-              <a:t> </a:t>
-            </a:r>
-            <a:r>
-              <a:rPr lang="fr-FR" dirty="0" err="1"/>
-              <a:t>Generator</a:t>
-            </a:r>
-            <a:endParaRPr lang="fr-FR" dirty="0"/>
+              <a:t>MongoDB</a:t>
+            </a:r>
           </a:p>
           <a:p>
             <a:pPr marL="0" indent="0">
@@ -5048,7 +5039,7 @@
         </p:nvSpPr>
         <p:spPr>
           <a:xfrm>
-            <a:off x="2493105" y="802299"/>
+            <a:off x="2493105" y="1102554"/>
             <a:ext cx="8561747" cy="2021584"/>
           </a:xfrm>
         </p:spPr>
@@ -5060,14 +5051,21 @@
           <a:p>
             <a:r>
               <a:rPr lang="fr-FR" sz="4000" dirty="0"/>
-              <a:t>Mise en place d’une Architecture Distribuée pour</a:t>
+              <a:t>Mise en place d’une</a:t>
             </a:r>
             <a:br>
               <a:rPr lang="fr-FR" sz="4000" dirty="0"/>
             </a:br>
             <a:r>
               <a:rPr lang="fr-FR" sz="4000" dirty="0"/>
-              <a:t>l’Analyse de Logs Web</a:t>
+              <a:t>Architecture Distribuée</a:t>
+            </a:r>
+            <a:br>
+              <a:rPr lang="fr-FR" sz="4000" dirty="0"/>
+            </a:br>
+            <a:r>
+              <a:rPr lang="fr-FR" sz="4000" dirty="0"/>
+              <a:t>pour l’Analyse de Logs Web</a:t>
             </a:r>
           </a:p>
         </p:txBody>
@@ -7243,8 +7241,8 @@
         </p:blipFill>
         <p:spPr>
           <a:xfrm>
-            <a:off x="8098971" y="1134484"/>
-            <a:ext cx="3653200" cy="4589031"/>
+            <a:off x="8188657" y="1106102"/>
+            <a:ext cx="3795529" cy="4767820"/>
           </a:xfrm>
         </p:spPr>
       </p:pic>
@@ -7595,6 +7593,36 @@
           </a:p>
         </p:txBody>
       </p:sp>
+      <p:pic>
+        <p:nvPicPr>
+          <p:cNvPr id="5" name="Image 4">
+            <a:extLst>
+              <a:ext uri="{FF2B5EF4-FFF2-40B4-BE49-F238E27FC236}">
+                <a16:creationId xmlns:a16="http://schemas.microsoft.com/office/drawing/2014/main" id="{C52AD8BF-814A-55F2-0312-6A2EE00F0542}"/>
+              </a:ext>
+            </a:extLst>
+          </p:cNvPr>
+          <p:cNvPicPr>
+            <a:picLocks noChangeAspect="1"/>
+          </p:cNvPicPr>
+          <p:nvPr/>
+        </p:nvPicPr>
+        <p:blipFill>
+          <a:blip r:embed="rId3"/>
+          <a:stretch>
+            <a:fillRect/>
+          </a:stretch>
+        </p:blipFill>
+        <p:spPr>
+          <a:xfrm>
+            <a:off x="7979162" y="1017061"/>
+            <a:ext cx="3985605" cy="4823878"/>
+          </a:xfrm>
+          <a:prstGeom prst="rect">
+            <a:avLst/>
+          </a:prstGeom>
+        </p:spPr>
+      </p:pic>
     </p:spTree>
     <p:extLst>
       <p:ext uri="{BB962C8B-B14F-4D97-AF65-F5344CB8AC3E}">

</xml_diff>

<commit_message>
Correcting figure logs in ppt
</commit_message>
<xml_diff>
--- a/presentation_projet_clement_lore.pptx
+++ b/presentation_projet_clement_lore.pptx
@@ -5433,10 +5433,10 @@
       </p:sp>
       <p:pic>
         <p:nvPicPr>
-          <p:cNvPr id="4" name="Image 3">
+          <p:cNvPr id="6" name="Image 5">
             <a:extLst>
               <a:ext uri="{FF2B5EF4-FFF2-40B4-BE49-F238E27FC236}">
-                <a16:creationId xmlns:a16="http://schemas.microsoft.com/office/drawing/2014/main" id="{4BBA365F-0BD9-4D08-8483-F63CECBFB229}"/>
+                <a16:creationId xmlns:a16="http://schemas.microsoft.com/office/drawing/2014/main" id="{3F1F6796-1BC2-6EE6-5F5F-52D9D80CB659}"/>
               </a:ext>
             </a:extLst>
           </p:cNvPr>
@@ -5459,8 +5459,8 @@
         </p:blipFill>
         <p:spPr>
           <a:xfrm>
-            <a:off x="1157895" y="3322316"/>
-            <a:ext cx="1517653" cy="1517653"/>
+            <a:off x="4278316" y="3928321"/>
+            <a:ext cx="2443997" cy="946564"/>
           </a:xfrm>
           <a:prstGeom prst="rect">
             <a:avLst/>
@@ -5469,10 +5469,10 @@
       </p:pic>
       <p:pic>
         <p:nvPicPr>
-          <p:cNvPr id="6" name="Image 5">
+          <p:cNvPr id="8" name="Image 7">
             <a:extLst>
               <a:ext uri="{FF2B5EF4-FFF2-40B4-BE49-F238E27FC236}">
-                <a16:creationId xmlns:a16="http://schemas.microsoft.com/office/drawing/2014/main" id="{3F1F6796-1BC2-6EE6-5F5F-52D9D80CB659}"/>
+                <a16:creationId xmlns:a16="http://schemas.microsoft.com/office/drawing/2014/main" id="{2C71649A-6036-9B73-5B6D-4F947D1E8D62}"/>
               </a:ext>
             </a:extLst>
           </p:cNvPr>
@@ -5495,8 +5495,8 @@
         </p:blipFill>
         <p:spPr>
           <a:xfrm>
-            <a:off x="4278316" y="3928321"/>
-            <a:ext cx="2443997" cy="946564"/>
+            <a:off x="8110687" y="3449799"/>
+            <a:ext cx="2443997" cy="1122918"/>
           </a:xfrm>
           <a:prstGeom prst="rect">
             <a:avLst/>
@@ -5505,10 +5505,10 @@
       </p:pic>
       <p:pic>
         <p:nvPicPr>
-          <p:cNvPr id="8" name="Image 7">
+          <p:cNvPr id="12" name="Image 11">
             <a:extLst>
               <a:ext uri="{FF2B5EF4-FFF2-40B4-BE49-F238E27FC236}">
-                <a16:creationId xmlns:a16="http://schemas.microsoft.com/office/drawing/2014/main" id="{2C71649A-6036-9B73-5B6D-4F947D1E8D62}"/>
+                <a16:creationId xmlns:a16="http://schemas.microsoft.com/office/drawing/2014/main" id="{D63B38BC-341B-EA70-CEDC-37C3010907A9}"/>
               </a:ext>
             </a:extLst>
           </p:cNvPr>
@@ -5531,20 +5531,320 @@
         </p:blipFill>
         <p:spPr>
           <a:xfrm>
-            <a:off x="8110687" y="3449799"/>
-            <a:ext cx="2443997" cy="1122918"/>
+            <a:off x="7397254" y="1335519"/>
+            <a:ext cx="3657600" cy="990600"/>
           </a:xfrm>
           <a:prstGeom prst="rect">
             <a:avLst/>
           </a:prstGeom>
         </p:spPr>
       </p:pic>
+      <p:sp>
+        <p:nvSpPr>
+          <p:cNvPr id="3" name="Flèche : droite 2">
+            <a:extLst>
+              <a:ext uri="{FF2B5EF4-FFF2-40B4-BE49-F238E27FC236}">
+                <a16:creationId xmlns:a16="http://schemas.microsoft.com/office/drawing/2014/main" id="{8F209F53-6B10-2C97-0E4E-2E9E74ACF3B4}"/>
+              </a:ext>
+            </a:extLst>
+          </p:cNvPr>
+          <p:cNvSpPr/>
+          <p:nvPr/>
+        </p:nvSpPr>
+        <p:spPr>
+          <a:xfrm>
+            <a:off x="3110926" y="4081142"/>
+            <a:ext cx="798022" cy="561460"/>
+          </a:xfrm>
+          <a:prstGeom prst="rightArrow">
+            <a:avLst/>
+          </a:prstGeom>
+        </p:spPr>
+        <p:style>
+          <a:lnRef idx="2">
+            <a:schemeClr val="accent1">
+              <a:shade val="15000"/>
+            </a:schemeClr>
+          </a:lnRef>
+          <a:fillRef idx="1">
+            <a:schemeClr val="accent1"/>
+          </a:fillRef>
+          <a:effectRef idx="0">
+            <a:schemeClr val="accent1"/>
+          </a:effectRef>
+          <a:fontRef idx="minor">
+            <a:schemeClr val="lt1"/>
+          </a:fontRef>
+        </p:style>
+        <p:txBody>
+          <a:bodyPr rtlCol="0" anchor="ctr"/>
+          <a:lstStyle/>
+          <a:p>
+            <a:pPr algn="ctr"/>
+            <a:endParaRPr lang="fr-FR"/>
+          </a:p>
+        </p:txBody>
+      </p:sp>
+      <p:sp>
+        <p:nvSpPr>
+          <p:cNvPr id="5" name="Flèche : droite 4">
+            <a:extLst>
+              <a:ext uri="{FF2B5EF4-FFF2-40B4-BE49-F238E27FC236}">
+                <a16:creationId xmlns:a16="http://schemas.microsoft.com/office/drawing/2014/main" id="{196E8A7B-3DD2-6651-C43F-FC956EEE83AE}"/>
+              </a:ext>
+            </a:extLst>
+          </p:cNvPr>
+          <p:cNvSpPr/>
+          <p:nvPr/>
+        </p:nvSpPr>
+        <p:spPr>
+          <a:xfrm>
+            <a:off x="7017489" y="4059499"/>
+            <a:ext cx="798022" cy="561460"/>
+          </a:xfrm>
+          <a:prstGeom prst="rightArrow">
+            <a:avLst/>
+          </a:prstGeom>
+        </p:spPr>
+        <p:style>
+          <a:lnRef idx="2">
+            <a:schemeClr val="accent1">
+              <a:shade val="15000"/>
+            </a:schemeClr>
+          </a:lnRef>
+          <a:fillRef idx="1">
+            <a:schemeClr val="accent1"/>
+          </a:fillRef>
+          <a:effectRef idx="0">
+            <a:schemeClr val="accent1"/>
+          </a:effectRef>
+          <a:fontRef idx="minor">
+            <a:schemeClr val="lt1"/>
+          </a:fontRef>
+        </p:style>
+        <p:txBody>
+          <a:bodyPr rtlCol="0" anchor="ctr"/>
+          <a:lstStyle/>
+          <a:p>
+            <a:pPr algn="ctr"/>
+            <a:endParaRPr lang="fr-FR"/>
+          </a:p>
+        </p:txBody>
+      </p:sp>
+      <p:sp>
+        <p:nvSpPr>
+          <p:cNvPr id="7" name="Flèche : droite 6">
+            <a:extLst>
+              <a:ext uri="{FF2B5EF4-FFF2-40B4-BE49-F238E27FC236}">
+                <a16:creationId xmlns:a16="http://schemas.microsoft.com/office/drawing/2014/main" id="{6645C4FD-9100-A6FF-E432-56EF8910C7D3}"/>
+              </a:ext>
+            </a:extLst>
+          </p:cNvPr>
+          <p:cNvSpPr/>
+          <p:nvPr/>
+        </p:nvSpPr>
+        <p:spPr>
+          <a:xfrm rot="16200000">
+            <a:off x="8652944" y="2635092"/>
+            <a:ext cx="798022" cy="561460"/>
+          </a:xfrm>
+          <a:prstGeom prst="rightArrow">
+            <a:avLst/>
+          </a:prstGeom>
+        </p:spPr>
+        <p:style>
+          <a:lnRef idx="2">
+            <a:schemeClr val="accent1">
+              <a:shade val="15000"/>
+            </a:schemeClr>
+          </a:lnRef>
+          <a:fillRef idx="1">
+            <a:schemeClr val="accent1"/>
+          </a:fillRef>
+          <a:effectRef idx="0">
+            <a:schemeClr val="accent1"/>
+          </a:effectRef>
+          <a:fontRef idx="minor">
+            <a:schemeClr val="lt1"/>
+          </a:fontRef>
+        </p:style>
+        <p:txBody>
+          <a:bodyPr rtlCol="0" anchor="ctr"/>
+          <a:lstStyle/>
+          <a:p>
+            <a:pPr algn="ctr"/>
+            <a:endParaRPr lang="fr-FR"/>
+          </a:p>
+        </p:txBody>
+      </p:sp>
+      <p:sp>
+        <p:nvSpPr>
+          <p:cNvPr id="9" name="ZoneTexte 8">
+            <a:extLst>
+              <a:ext uri="{FF2B5EF4-FFF2-40B4-BE49-F238E27FC236}">
+                <a16:creationId xmlns:a16="http://schemas.microsoft.com/office/drawing/2014/main" id="{F5059026-B953-A02F-B746-8CEBA6BAD594}"/>
+              </a:ext>
+            </a:extLst>
+          </p:cNvPr>
+          <p:cNvSpPr txBox="1"/>
+          <p:nvPr/>
+        </p:nvSpPr>
+        <p:spPr>
+          <a:xfrm>
+            <a:off x="1223904" y="4717262"/>
+            <a:ext cx="1517653" cy="369332"/>
+          </a:xfrm>
+          <a:prstGeom prst="rect">
+            <a:avLst/>
+          </a:prstGeom>
+          <a:noFill/>
+        </p:spPr>
+        <p:txBody>
+          <a:bodyPr wrap="square" rtlCol="0">
+            <a:spAutoFit/>
+          </a:bodyPr>
+          <a:lstStyle/>
+          <a:p>
+            <a:r>
+              <a:rPr lang="fr-FR" dirty="0"/>
+              <a:t>Fichier local</a:t>
+            </a:r>
+          </a:p>
+        </p:txBody>
+      </p:sp>
+      <p:sp>
+        <p:nvSpPr>
+          <p:cNvPr id="10" name="ZoneTexte 9">
+            <a:extLst>
+              <a:ext uri="{FF2B5EF4-FFF2-40B4-BE49-F238E27FC236}">
+                <a16:creationId xmlns:a16="http://schemas.microsoft.com/office/drawing/2014/main" id="{F35408CF-EB77-0A81-1515-12AEBBF1D5B1}"/>
+              </a:ext>
+            </a:extLst>
+          </p:cNvPr>
+          <p:cNvSpPr txBox="1"/>
+          <p:nvPr/>
+        </p:nvSpPr>
+        <p:spPr>
+          <a:xfrm>
+            <a:off x="4464803" y="4775912"/>
+            <a:ext cx="2676226" cy="923330"/>
+          </a:xfrm>
+          <a:prstGeom prst="rect">
+            <a:avLst/>
+          </a:prstGeom>
+          <a:noFill/>
+        </p:spPr>
+        <p:txBody>
+          <a:bodyPr wrap="square" rtlCol="0">
+            <a:spAutoFit/>
+          </a:bodyPr>
+          <a:lstStyle/>
+          <a:p>
+            <a:r>
+              <a:rPr lang="fr-FR" dirty="0"/>
+              <a:t>1 </a:t>
+            </a:r>
+            <a:r>
+              <a:rPr lang="fr-FR" dirty="0" err="1"/>
+              <a:t>namenode</a:t>
+            </a:r>
+            <a:endParaRPr lang="fr-FR" dirty="0"/>
+          </a:p>
+          <a:p>
+            <a:r>
+              <a:rPr lang="fr-FR" dirty="0"/>
+              <a:t>1 </a:t>
+            </a:r>
+            <a:r>
+              <a:rPr lang="fr-FR" dirty="0" err="1"/>
+              <a:t>secondary</a:t>
+            </a:r>
+            <a:r>
+              <a:rPr lang="fr-FR" dirty="0"/>
+              <a:t> </a:t>
+            </a:r>
+            <a:r>
+              <a:rPr lang="fr-FR" dirty="0" err="1"/>
+              <a:t>namenode</a:t>
+            </a:r>
+            <a:endParaRPr lang="fr-FR" dirty="0"/>
+          </a:p>
+          <a:p>
+            <a:r>
+              <a:rPr lang="fr-FR" dirty="0"/>
+              <a:t>4 </a:t>
+            </a:r>
+            <a:r>
+              <a:rPr lang="fr-FR" dirty="0" err="1"/>
+              <a:t>datanodes</a:t>
+            </a:r>
+            <a:endParaRPr lang="fr-FR" dirty="0"/>
+          </a:p>
+        </p:txBody>
+      </p:sp>
+      <p:sp>
+        <p:nvSpPr>
+          <p:cNvPr id="11" name="ZoneTexte 10">
+            <a:extLst>
+              <a:ext uri="{FF2B5EF4-FFF2-40B4-BE49-F238E27FC236}">
+                <a16:creationId xmlns:a16="http://schemas.microsoft.com/office/drawing/2014/main" id="{EACB4A89-5B6C-DD43-ABEA-6D4BE70B00EA}"/>
+              </a:ext>
+            </a:extLst>
+          </p:cNvPr>
+          <p:cNvSpPr txBox="1"/>
+          <p:nvPr/>
+        </p:nvSpPr>
+        <p:spPr>
+          <a:xfrm>
+            <a:off x="8259072" y="4954102"/>
+            <a:ext cx="2295612" cy="923330"/>
+          </a:xfrm>
+          <a:prstGeom prst="rect">
+            <a:avLst/>
+          </a:prstGeom>
+          <a:noFill/>
+        </p:spPr>
+        <p:txBody>
+          <a:bodyPr wrap="square" rtlCol="0">
+            <a:spAutoFit/>
+          </a:bodyPr>
+          <a:lstStyle/>
+          <a:p>
+            <a:r>
+              <a:rPr lang="fr-FR" dirty="0"/>
+              <a:t>1 </a:t>
+            </a:r>
+            <a:r>
+              <a:rPr lang="fr-FR" dirty="0" err="1"/>
+              <a:t>spark</a:t>
+            </a:r>
+            <a:r>
+              <a:rPr lang="fr-FR" dirty="0"/>
+              <a:t>-master</a:t>
+            </a:r>
+          </a:p>
+          <a:p>
+            <a:r>
+              <a:rPr lang="fr-FR" dirty="0"/>
+              <a:t>4 </a:t>
+            </a:r>
+            <a:r>
+              <a:rPr lang="fr-FR" dirty="0" err="1"/>
+              <a:t>spark-workers</a:t>
+            </a:r>
+            <a:endParaRPr lang="fr-FR" dirty="0"/>
+          </a:p>
+          <a:p>
+            <a:endParaRPr lang="fr-FR" dirty="0"/>
+          </a:p>
+        </p:txBody>
+      </p:sp>
       <p:pic>
         <p:nvPicPr>
-          <p:cNvPr id="12" name="Image 11">
+          <p:cNvPr id="13" name="Image 12">
             <a:extLst>
               <a:ext uri="{FF2B5EF4-FFF2-40B4-BE49-F238E27FC236}">
-                <a16:creationId xmlns:a16="http://schemas.microsoft.com/office/drawing/2014/main" id="{D63B38BC-341B-EA70-CEDC-37C3010907A9}"/>
+                <a16:creationId xmlns:a16="http://schemas.microsoft.com/office/drawing/2014/main" id="{FE79D11C-C495-77A4-8B42-5A02C33D38BD}"/>
               </a:ext>
             </a:extLst>
           </p:cNvPr>
@@ -5567,8 +5867,8 @@
         </p:blipFill>
         <p:spPr>
           <a:xfrm>
-            <a:off x="7397254" y="1335519"/>
-            <a:ext cx="3657600" cy="990600"/>
+            <a:off x="1159265" y="3199609"/>
+            <a:ext cx="1517653" cy="1517653"/>
           </a:xfrm>
           <a:prstGeom prst="rect">
             <a:avLst/>
@@ -5577,10 +5877,10 @@
       </p:pic>
       <p:sp>
         <p:nvSpPr>
-          <p:cNvPr id="3" name="Flèche : droite 2">
+          <p:cNvPr id="14" name="Rectangle : coins arrondis 13">
             <a:extLst>
               <a:ext uri="{FF2B5EF4-FFF2-40B4-BE49-F238E27FC236}">
-                <a16:creationId xmlns:a16="http://schemas.microsoft.com/office/drawing/2014/main" id="{8F209F53-6B10-2C97-0E4E-2E9E74ACF3B4}"/>
+                <a16:creationId xmlns:a16="http://schemas.microsoft.com/office/drawing/2014/main" id="{DD575EDA-9057-CB0E-1EB8-8B44518FE5DB}"/>
               </a:ext>
             </a:extLst>
           </p:cNvPr>
@@ -5589,12 +5889,18 @@
         </p:nvSpPr>
         <p:spPr>
           <a:xfrm>
-            <a:off x="3110926" y="4081142"/>
-            <a:ext cx="798022" cy="561460"/>
-          </a:xfrm>
-          <a:prstGeom prst="rightArrow">
+            <a:off x="1458440" y="4164128"/>
+            <a:ext cx="916562" cy="355767"/>
+          </a:xfrm>
+          <a:prstGeom prst="roundRect">
             <a:avLst/>
           </a:prstGeom>
+          <a:solidFill>
+            <a:srgbClr val="1FB35B"/>
+          </a:solidFill>
+          <a:ln>
+            <a:noFill/>
+          </a:ln>
         </p:spPr>
         <p:style>
           <a:lnRef idx="2">
@@ -5623,102 +5929,10 @@
       </p:sp>
       <p:sp>
         <p:nvSpPr>
-          <p:cNvPr id="5" name="Flèche : droite 4">
+          <p:cNvPr id="15" name="ZoneTexte 14">
             <a:extLst>
               <a:ext uri="{FF2B5EF4-FFF2-40B4-BE49-F238E27FC236}">
-                <a16:creationId xmlns:a16="http://schemas.microsoft.com/office/drawing/2014/main" id="{196E8A7B-3DD2-6651-C43F-FC956EEE83AE}"/>
-              </a:ext>
-            </a:extLst>
-          </p:cNvPr>
-          <p:cNvSpPr/>
-          <p:nvPr/>
-        </p:nvSpPr>
-        <p:spPr>
-          <a:xfrm>
-            <a:off x="7017489" y="4059499"/>
-            <a:ext cx="798022" cy="561460"/>
-          </a:xfrm>
-          <a:prstGeom prst="rightArrow">
-            <a:avLst/>
-          </a:prstGeom>
-        </p:spPr>
-        <p:style>
-          <a:lnRef idx="2">
-            <a:schemeClr val="accent1">
-              <a:shade val="15000"/>
-            </a:schemeClr>
-          </a:lnRef>
-          <a:fillRef idx="1">
-            <a:schemeClr val="accent1"/>
-          </a:fillRef>
-          <a:effectRef idx="0">
-            <a:schemeClr val="accent1"/>
-          </a:effectRef>
-          <a:fontRef idx="minor">
-            <a:schemeClr val="lt1"/>
-          </a:fontRef>
-        </p:style>
-        <p:txBody>
-          <a:bodyPr rtlCol="0" anchor="ctr"/>
-          <a:lstStyle/>
-          <a:p>
-            <a:pPr algn="ctr"/>
-            <a:endParaRPr lang="fr-FR"/>
-          </a:p>
-        </p:txBody>
-      </p:sp>
-      <p:sp>
-        <p:nvSpPr>
-          <p:cNvPr id="7" name="Flèche : droite 6">
-            <a:extLst>
-              <a:ext uri="{FF2B5EF4-FFF2-40B4-BE49-F238E27FC236}">
-                <a16:creationId xmlns:a16="http://schemas.microsoft.com/office/drawing/2014/main" id="{6645C4FD-9100-A6FF-E432-56EF8910C7D3}"/>
-              </a:ext>
-            </a:extLst>
-          </p:cNvPr>
-          <p:cNvSpPr/>
-          <p:nvPr/>
-        </p:nvSpPr>
-        <p:spPr>
-          <a:xfrm rot="16200000">
-            <a:off x="8652944" y="2635092"/>
-            <a:ext cx="798022" cy="561460"/>
-          </a:xfrm>
-          <a:prstGeom prst="rightArrow">
-            <a:avLst/>
-          </a:prstGeom>
-        </p:spPr>
-        <p:style>
-          <a:lnRef idx="2">
-            <a:schemeClr val="accent1">
-              <a:shade val="15000"/>
-            </a:schemeClr>
-          </a:lnRef>
-          <a:fillRef idx="1">
-            <a:schemeClr val="accent1"/>
-          </a:fillRef>
-          <a:effectRef idx="0">
-            <a:schemeClr val="accent1"/>
-          </a:effectRef>
-          <a:fontRef idx="minor">
-            <a:schemeClr val="lt1"/>
-          </a:fontRef>
-        </p:style>
-        <p:txBody>
-          <a:bodyPr rtlCol="0" anchor="ctr"/>
-          <a:lstStyle/>
-          <a:p>
-            <a:pPr algn="ctr"/>
-            <a:endParaRPr lang="fr-FR"/>
-          </a:p>
-        </p:txBody>
-      </p:sp>
-      <p:sp>
-        <p:nvSpPr>
-          <p:cNvPr id="9" name="ZoneTexte 8">
-            <a:extLst>
-              <a:ext uri="{FF2B5EF4-FFF2-40B4-BE49-F238E27FC236}">
-                <a16:creationId xmlns:a16="http://schemas.microsoft.com/office/drawing/2014/main" id="{F5059026-B953-A02F-B746-8CEBA6BAD594}"/>
+                <a16:creationId xmlns:a16="http://schemas.microsoft.com/office/drawing/2014/main" id="{CF26B50E-F4EB-10C1-B90B-D4ACEEE127D9}"/>
               </a:ext>
             </a:extLst>
           </p:cNvPr>
@@ -5727,8 +5941,8 @@
         </p:nvSpPr>
         <p:spPr>
           <a:xfrm>
-            <a:off x="1223904" y="4717262"/>
-            <a:ext cx="1517653" cy="369332"/>
+            <a:off x="1508206" y="4078872"/>
+            <a:ext cx="852281" cy="461665"/>
           </a:xfrm>
           <a:prstGeom prst="rect">
             <a:avLst/>
@@ -5742,136 +5956,13 @@
           <a:lstStyle/>
           <a:p>
             <a:r>
-              <a:rPr lang="fr-FR" dirty="0"/>
-              <a:t>Fichier local</a:t>
-            </a:r>
-          </a:p>
-        </p:txBody>
-      </p:sp>
-      <p:sp>
-        <p:nvSpPr>
-          <p:cNvPr id="10" name="ZoneTexte 9">
-            <a:extLst>
-              <a:ext uri="{FF2B5EF4-FFF2-40B4-BE49-F238E27FC236}">
-                <a16:creationId xmlns:a16="http://schemas.microsoft.com/office/drawing/2014/main" id="{F35408CF-EB77-0A81-1515-12AEBBF1D5B1}"/>
-              </a:ext>
-            </a:extLst>
-          </p:cNvPr>
-          <p:cNvSpPr txBox="1"/>
-          <p:nvPr/>
-        </p:nvSpPr>
-        <p:spPr>
-          <a:xfrm>
-            <a:off x="4464803" y="4775912"/>
-            <a:ext cx="2676226" cy="923330"/>
-          </a:xfrm>
-          <a:prstGeom prst="rect">
-            <a:avLst/>
-          </a:prstGeom>
-          <a:noFill/>
-        </p:spPr>
-        <p:txBody>
-          <a:bodyPr wrap="square" rtlCol="0">
-            <a:spAutoFit/>
-          </a:bodyPr>
-          <a:lstStyle/>
-          <a:p>
-            <a:r>
-              <a:rPr lang="fr-FR" dirty="0"/>
-              <a:t>1 </a:t>
-            </a:r>
-            <a:r>
-              <a:rPr lang="fr-FR" dirty="0" err="1"/>
-              <a:t>namenode</a:t>
-            </a:r>
-            <a:endParaRPr lang="fr-FR" dirty="0"/>
-          </a:p>
-          <a:p>
-            <a:r>
-              <a:rPr lang="fr-FR" dirty="0"/>
-              <a:t>1 </a:t>
-            </a:r>
-            <a:r>
-              <a:rPr lang="fr-FR" dirty="0" err="1"/>
-              <a:t>secondary</a:t>
-            </a:r>
-            <a:r>
-              <a:rPr lang="fr-FR" dirty="0"/>
-              <a:t> </a:t>
-            </a:r>
-            <a:r>
-              <a:rPr lang="fr-FR" dirty="0" err="1"/>
-              <a:t>namenode</a:t>
-            </a:r>
-            <a:endParaRPr lang="fr-FR" dirty="0"/>
-          </a:p>
-          <a:p>
-            <a:r>
-              <a:rPr lang="fr-FR" dirty="0"/>
-              <a:t>4 </a:t>
-            </a:r>
-            <a:r>
-              <a:rPr lang="fr-FR" dirty="0" err="1"/>
-              <a:t>datanodes</a:t>
-            </a:r>
-            <a:endParaRPr lang="fr-FR" dirty="0"/>
-          </a:p>
-        </p:txBody>
-      </p:sp>
-      <p:sp>
-        <p:nvSpPr>
-          <p:cNvPr id="11" name="ZoneTexte 10">
-            <a:extLst>
-              <a:ext uri="{FF2B5EF4-FFF2-40B4-BE49-F238E27FC236}">
-                <a16:creationId xmlns:a16="http://schemas.microsoft.com/office/drawing/2014/main" id="{EACB4A89-5B6C-DD43-ABEA-6D4BE70B00EA}"/>
-              </a:ext>
-            </a:extLst>
-          </p:cNvPr>
-          <p:cNvSpPr txBox="1"/>
-          <p:nvPr/>
-        </p:nvSpPr>
-        <p:spPr>
-          <a:xfrm>
-            <a:off x="8259072" y="4954102"/>
-            <a:ext cx="2295612" cy="923330"/>
-          </a:xfrm>
-          <a:prstGeom prst="rect">
-            <a:avLst/>
-          </a:prstGeom>
-          <a:noFill/>
-        </p:spPr>
-        <p:txBody>
-          <a:bodyPr wrap="square" rtlCol="0">
-            <a:spAutoFit/>
-          </a:bodyPr>
-          <a:lstStyle/>
-          <a:p>
-            <a:r>
-              <a:rPr lang="fr-FR" dirty="0"/>
-              <a:t>1 </a:t>
-            </a:r>
-            <a:r>
-              <a:rPr lang="fr-FR" dirty="0" err="1"/>
-              <a:t>spark</a:t>
-            </a:r>
-            <a:r>
-              <a:rPr lang="fr-FR" dirty="0"/>
-              <a:t>-master</a:t>
-            </a:r>
-          </a:p>
-          <a:p>
-            <a:r>
-              <a:rPr lang="fr-FR" dirty="0"/>
-              <a:t>4 </a:t>
-            </a:r>
-            <a:r>
-              <a:rPr lang="fr-FR" dirty="0" err="1"/>
-              <a:t>spark-workers</a:t>
-            </a:r>
-            <a:endParaRPr lang="fr-FR" dirty="0"/>
-          </a:p>
-          <a:p>
-            <a:endParaRPr lang="fr-FR" dirty="0"/>
+              <a:rPr lang="fr-FR" sz="2400" b="1" dirty="0">
+                <a:solidFill>
+                  <a:schemeClr val="bg1"/>
+                </a:solidFill>
+              </a:rPr>
+              <a:t>.log</a:t>
+            </a:r>
           </a:p>
         </p:txBody>
       </p:sp>
@@ -6397,6 +6488,97 @@
           </a:p>
           <a:p>
             <a:endParaRPr lang="fr-FR" dirty="0"/>
+          </a:p>
+        </p:txBody>
+      </p:sp>
+      <p:sp>
+        <p:nvSpPr>
+          <p:cNvPr id="3" name="Rectangle : coins arrondis 2">
+            <a:extLst>
+              <a:ext uri="{FF2B5EF4-FFF2-40B4-BE49-F238E27FC236}">
+                <a16:creationId xmlns:a16="http://schemas.microsoft.com/office/drawing/2014/main" id="{4368AE01-5CE7-B35F-DFA2-DA451CBADF26}"/>
+              </a:ext>
+            </a:extLst>
+          </p:cNvPr>
+          <p:cNvSpPr/>
+          <p:nvPr/>
+        </p:nvSpPr>
+        <p:spPr>
+          <a:xfrm>
+            <a:off x="1059543" y="4353304"/>
+            <a:ext cx="916562" cy="355767"/>
+          </a:xfrm>
+          <a:prstGeom prst="roundRect">
+            <a:avLst/>
+          </a:prstGeom>
+          <a:solidFill>
+            <a:srgbClr val="1FB35B"/>
+          </a:solidFill>
+          <a:ln>
+            <a:noFill/>
+          </a:ln>
+        </p:spPr>
+        <p:style>
+          <a:lnRef idx="2">
+            <a:schemeClr val="accent1">
+              <a:shade val="15000"/>
+            </a:schemeClr>
+          </a:lnRef>
+          <a:fillRef idx="1">
+            <a:schemeClr val="accent1"/>
+          </a:fillRef>
+          <a:effectRef idx="0">
+            <a:schemeClr val="accent1"/>
+          </a:effectRef>
+          <a:fontRef idx="minor">
+            <a:schemeClr val="lt1"/>
+          </a:fontRef>
+        </p:style>
+        <p:txBody>
+          <a:bodyPr rtlCol="0" anchor="ctr"/>
+          <a:lstStyle/>
+          <a:p>
+            <a:pPr algn="ctr"/>
+            <a:endParaRPr lang="fr-FR"/>
+          </a:p>
+        </p:txBody>
+      </p:sp>
+      <p:sp>
+        <p:nvSpPr>
+          <p:cNvPr id="10" name="ZoneTexte 9">
+            <a:extLst>
+              <a:ext uri="{FF2B5EF4-FFF2-40B4-BE49-F238E27FC236}">
+                <a16:creationId xmlns:a16="http://schemas.microsoft.com/office/drawing/2014/main" id="{F753D8D2-DCA7-FE8C-9A45-60FD6124F0CA}"/>
+              </a:ext>
+            </a:extLst>
+          </p:cNvPr>
+          <p:cNvSpPr txBox="1"/>
+          <p:nvPr/>
+        </p:nvSpPr>
+        <p:spPr>
+          <a:xfrm>
+            <a:off x="1109309" y="4268048"/>
+            <a:ext cx="852281" cy="461665"/>
+          </a:xfrm>
+          <a:prstGeom prst="rect">
+            <a:avLst/>
+          </a:prstGeom>
+          <a:noFill/>
+        </p:spPr>
+        <p:txBody>
+          <a:bodyPr wrap="square" rtlCol="0">
+            <a:spAutoFit/>
+          </a:bodyPr>
+          <a:lstStyle/>
+          <a:p>
+            <a:r>
+              <a:rPr lang="fr-FR" sz="2400" b="1" dirty="0">
+                <a:solidFill>
+                  <a:schemeClr val="bg1"/>
+                </a:solidFill>
+              </a:rPr>
+              <a:t>.log</a:t>
+            </a:r>
           </a:p>
         </p:txBody>
       </p:sp>

</xml_diff>